<commit_message>
tweaked L4.1-4.2, added Examples/Example 4.1
</commit_message>
<xml_diff>
--- a/Slides/Lesson 4.1 The JavaScript Handler Model.pptx
+++ b/Slides/Lesson 4.1 The JavaScript Handler Model.pptx
@@ -5,7 +5,7 @@
     <p:sldMasterId id="2147483648" r:id="rId1"/>
   </p:sldMasterIdLst>
   <p:notesMasterIdLst>
-    <p:notesMasterId r:id="rId23"/>
+    <p:notesMasterId r:id="rId24"/>
   </p:notesMasterIdLst>
   <p:sldIdLst>
     <p:sldId id="256" r:id="rId2"/>
@@ -19,44 +19,45 @@
     <p:sldId id="354" r:id="rId10"/>
     <p:sldId id="366" r:id="rId11"/>
     <p:sldId id="367" r:id="rId12"/>
-    <p:sldId id="368" r:id="rId13"/>
-    <p:sldId id="356" r:id="rId14"/>
-    <p:sldId id="369" r:id="rId15"/>
-    <p:sldId id="370" r:id="rId16"/>
-    <p:sldId id="371" r:id="rId17"/>
-    <p:sldId id="372" r:id="rId18"/>
-    <p:sldId id="360" r:id="rId19"/>
-    <p:sldId id="303" r:id="rId20"/>
-    <p:sldId id="298" r:id="rId21"/>
-    <p:sldId id="348" r:id="rId22"/>
+    <p:sldId id="373" r:id="rId13"/>
+    <p:sldId id="368" r:id="rId14"/>
+    <p:sldId id="356" r:id="rId15"/>
+    <p:sldId id="369" r:id="rId16"/>
+    <p:sldId id="370" r:id="rId17"/>
+    <p:sldId id="371" r:id="rId18"/>
+    <p:sldId id="372" r:id="rId19"/>
+    <p:sldId id="360" r:id="rId20"/>
+    <p:sldId id="303" r:id="rId21"/>
+    <p:sldId id="298" r:id="rId22"/>
+    <p:sldId id="348" r:id="rId23"/>
   </p:sldIdLst>
   <p:sldSz cx="12192000" cy="6858000"/>
   <p:notesSz cx="6858000" cy="9144000"/>
   <p:embeddedFontLst>
     <p:embeddedFont>
       <p:font typeface="Calibri" panose="020F0502020204030204" pitchFamily="34" charset="0"/>
-      <p:regular r:id="rId24"/>
-      <p:bold r:id="rId25"/>
-      <p:italic r:id="rId26"/>
-      <p:boldItalic r:id="rId27"/>
+      <p:regular r:id="rId25"/>
+      <p:bold r:id="rId26"/>
+      <p:italic r:id="rId27"/>
+      <p:boldItalic r:id="rId28"/>
     </p:embeddedFont>
     <p:embeddedFont>
       <p:font typeface="Consolas" panose="020B0609020204030204" pitchFamily="49" charset="0"/>
-      <p:regular r:id="rId28"/>
-      <p:bold r:id="rId29"/>
-      <p:italic r:id="rId30"/>
-      <p:boldItalic r:id="rId31"/>
+      <p:regular r:id="rId29"/>
+      <p:bold r:id="rId30"/>
+      <p:italic r:id="rId31"/>
+      <p:boldItalic r:id="rId32"/>
     </p:embeddedFont>
     <p:embeddedFont>
       <p:font typeface="Ink Free" panose="03080402000500000000" pitchFamily="66" charset="0"/>
-      <p:regular r:id="rId32"/>
+      <p:regular r:id="rId33"/>
     </p:embeddedFont>
     <p:embeddedFont>
       <p:font typeface="Verdana" panose="020B0604030504040204" pitchFamily="34" charset="0"/>
-      <p:regular r:id="rId33"/>
-      <p:bold r:id="rId34"/>
-      <p:italic r:id="rId35"/>
-      <p:boldItalic r:id="rId36"/>
+      <p:regular r:id="rId34"/>
+      <p:bold r:id="rId35"/>
+      <p:italic r:id="rId36"/>
+      <p:boldItalic r:id="rId37"/>
     </p:embeddedFont>
   </p:embeddedFontLst>
   <p:defaultTextStyle>
@@ -244,7 +245,7 @@
           <a:p>
             <a:fld id="{7C7E5181-6CF5-45F7-A87A-E0E0B1FD7549}" type="datetimeFigureOut">
               <a:rPr lang="en-US" smtClean="0"/>
-              <a:t>2/6/2021</a:t>
+              <a:t>2/7/2021</a:t>
             </a:fld>
             <a:endParaRPr lang="en-US"/>
           </a:p>
@@ -665,7 +666,7 @@
           <a:p>
             <a:fld id="{5D2A64DE-480B-420F-9649-4F8E696E08E0}" type="datetime1">
               <a:rPr lang="en-US" smtClean="0"/>
-              <a:t>2/6/2021</a:t>
+              <a:t>2/7/2021</a:t>
             </a:fld>
             <a:endParaRPr lang="en-US"/>
           </a:p>
@@ -899,7 +900,7 @@
           <a:p>
             <a:fld id="{0D3616D0-8311-4107-9726-6B805E7D05BA}" type="datetime1">
               <a:rPr lang="en-US" smtClean="0"/>
-              <a:t>2/6/2021</a:t>
+              <a:t>2/7/2021</a:t>
             </a:fld>
             <a:endParaRPr lang="en-US"/>
           </a:p>
@@ -1107,7 +1108,7 @@
           <a:p>
             <a:fld id="{3BC2557A-5C88-417A-A763-5AC779462A5F}" type="datetime1">
               <a:rPr lang="en-US" smtClean="0"/>
-              <a:t>2/6/2021</a:t>
+              <a:t>2/7/2021</a:t>
             </a:fld>
             <a:endParaRPr lang="en-US"/>
           </a:p>
@@ -1859,7 +1860,7 @@
           <a:p>
             <a:fld id="{07C7BFD4-467E-4EDE-93EA-052F5B39A4E5}" type="datetime1">
               <a:rPr lang="en-US" smtClean="0"/>
-              <a:t>2/6/2021</a:t>
+              <a:t>2/7/2021</a:t>
             </a:fld>
             <a:endParaRPr lang="en-US"/>
           </a:p>
@@ -2172,7 +2173,7 @@
           <a:p>
             <a:fld id="{A533CBE2-D5BE-47AC-ADC2-9CDFC1D0CF90}" type="datetime1">
               <a:rPr lang="en-US" smtClean="0"/>
-              <a:t>2/6/2021</a:t>
+              <a:t>2/7/2021</a:t>
             </a:fld>
             <a:endParaRPr lang="en-US"/>
           </a:p>
@@ -2473,7 +2474,7 @@
           <a:p>
             <a:fld id="{39B7EDB1-CE74-4951-85A2-0B01C2128E28}" type="datetime1">
               <a:rPr lang="en-US" smtClean="0"/>
-              <a:t>2/6/2021</a:t>
+              <a:t>2/7/2021</a:t>
             </a:fld>
             <a:endParaRPr lang="en-US"/>
           </a:p>
@@ -2921,7 +2922,7 @@
           <a:p>
             <a:fld id="{2BC7EB92-A5C2-4807-A9DC-9EDE6CBFB241}" type="datetime1">
               <a:rPr lang="en-US" smtClean="0"/>
-              <a:t>2/6/2021</a:t>
+              <a:t>2/7/2021</a:t>
             </a:fld>
             <a:endParaRPr lang="en-US"/>
           </a:p>
@@ -3067,7 +3068,7 @@
           <a:p>
             <a:fld id="{109E55A0-C911-4F03-82FC-7E5926047D46}" type="datetime1">
               <a:rPr lang="en-US" smtClean="0"/>
-              <a:t>2/6/2021</a:t>
+              <a:t>2/7/2021</a:t>
             </a:fld>
             <a:endParaRPr lang="en-US"/>
           </a:p>
@@ -3216,7 +3217,7 @@
           <a:p>
             <a:fld id="{2B7B7EE0-7771-4CD5-9B2B-3550753A54A1}" type="datetime1">
               <a:rPr lang="en-US" smtClean="0"/>
-              <a:t>2/6/2021</a:t>
+              <a:t>2/7/2021</a:t>
             </a:fld>
             <a:endParaRPr lang="en-US"/>
           </a:p>
@@ -3527,7 +3528,7 @@
           <a:p>
             <a:fld id="{F8B318B3-0E87-4416-A9B8-D891968C2727}" type="datetime1">
               <a:rPr lang="en-US" smtClean="0"/>
-              <a:t>2/6/2021</a:t>
+              <a:t>2/7/2021</a:t>
             </a:fld>
             <a:endParaRPr lang="en-US"/>
           </a:p>
@@ -3815,7 +3816,7 @@
           <a:p>
             <a:fld id="{EA476A42-A091-4468-A075-64A31BE59948}" type="datetime1">
               <a:rPr lang="en-US" smtClean="0"/>
-              <a:t>2/6/2021</a:t>
+              <a:t>2/7/2021</a:t>
             </a:fld>
             <a:endParaRPr lang="en-US"/>
           </a:p>
@@ -4056,7 +4057,7 @@
           <a:p>
             <a:fld id="{54D997E8-DDEE-43F1-8D9B-F8A1E11DE488}" type="datetime1">
               <a:rPr lang="en-US" smtClean="0"/>
-              <a:t>2/6/2021</a:t>
+              <a:t>2/7/2021</a:t>
             </a:fld>
             <a:endParaRPr lang="en-US"/>
           </a:p>
@@ -4549,7 +4550,7 @@
               <a:rPr lang="en-US" altLang="en-US" dirty="0">
                 <a:sym typeface="Calibri" charset="0"/>
               </a:rPr>
-              <a:t> event handler model</a:t>
+              <a:t> Event Handler Model</a:t>
             </a:r>
             <a:endParaRPr lang="en-US" sz="3200" dirty="0"/>
           </a:p>
@@ -4890,7 +4891,15 @@
           <a:p>
             <a:r>
               <a:rPr lang="en-US" dirty="0"/>
-              <a:t>A promise may have a catch property, which is a handler to be invoked when the promise is rejected</a:t>
+              <a:t>A promise may also have a </a:t>
+            </a:r>
+            <a:r>
+              <a:rPr lang="en-US" b="1" dirty="0"/>
+              <a:t>catch</a:t>
+            </a:r>
+            <a:r>
+              <a:rPr lang="en-US" dirty="0"/>
+              <a:t> property, which is a handler to be invoked when the promise is rejected</a:t>
             </a:r>
           </a:p>
           <a:p>
@@ -5008,13 +5017,13 @@
           <a:p>
             <a:r>
               <a:rPr lang="en-US" dirty="0"/>
-              <a:t>Asynchronous operations (like input/output operations) are typically exported as promises (or as functions that return promises)</a:t>
+              <a:t>Asynchronous operations (like input/output operations) are typically exported as functions that return promises.</a:t>
             </a:r>
           </a:p>
           <a:p>
             <a:r>
               <a:rPr lang="en-US" dirty="0"/>
-              <a:t>So we'll concentrate on using promises, by using .</a:t>
+              <a:t>So we'll concentrate on the use of promises, by utilizing the .</a:t>
             </a:r>
             <a:r>
               <a:rPr lang="en-US" b="1" dirty="0"/>
@@ -5292,7 +5301,7 @@
           <p:cNvPr id="2" name="Title 1">
             <a:extLst>
               <a:ext uri="{FF2B5EF4-FFF2-40B4-BE49-F238E27FC236}">
-                <a16:creationId xmlns:a16="http://schemas.microsoft.com/office/drawing/2014/main" id="{CB681681-DC3F-4C82-8A29-BDDAACCA6A4D}"/>
+                <a16:creationId xmlns:a16="http://schemas.microsoft.com/office/drawing/2014/main" id="{9943F821-9BEE-48A0-9A22-4B5352A133E8}"/>
               </a:ext>
             </a:extLst>
           </p:cNvPr>
@@ -5310,69 +5319,7 @@
           <a:p>
             <a:r>
               <a:rPr lang="en-US" dirty="0"/>
-              <a:t>Extending promises with callbacks</a:t>
-            </a:r>
-          </a:p>
-        </p:txBody>
-      </p:sp>
-      <p:sp>
-        <p:nvSpPr>
-          <p:cNvPr id="3" name="Content Placeholder 2">
-            <a:extLst>
-              <a:ext uri="{FF2B5EF4-FFF2-40B4-BE49-F238E27FC236}">
-                <a16:creationId xmlns:a16="http://schemas.microsoft.com/office/drawing/2014/main" id="{A9A6AF18-5562-413A-AAC0-CC3469FE5B5B}"/>
-              </a:ext>
-            </a:extLst>
-          </p:cNvPr>
-          <p:cNvSpPr>
-            <a:spLocks noGrp="1"/>
-          </p:cNvSpPr>
-          <p:nvPr>
-            <p:ph idx="1"/>
-          </p:nvPr>
-        </p:nvSpPr>
-        <p:spPr/>
-        <p:txBody>
-          <a:bodyPr/>
-          <a:lstStyle/>
-          <a:p>
-            <a:r>
-              <a:rPr lang="en-US" dirty="0"/>
-              <a:t>const p2 = p1.then(callback) creates a new promise that represents the result of promise p1 followed by the callback (if p1 fulfills)</a:t>
-            </a:r>
-          </a:p>
-          <a:p>
-            <a:r>
-              <a:rPr lang="en-US" dirty="0"/>
-              <a:t>This is a </a:t>
-            </a:r>
-            <a:r>
-              <a:rPr lang="en-US" i="1" dirty="0"/>
-              <a:t>new</a:t>
-            </a:r>
-            <a:r>
-              <a:rPr lang="en-US" dirty="0"/>
-              <a:t> promise.  </a:t>
-            </a:r>
-          </a:p>
-          <a:p>
-            <a:r>
-              <a:rPr lang="en-US" dirty="0"/>
-              <a:t>When p2 is run, it refers to p1.  If p1 has already been fulfilled, its value is passed to the callback. p1 is </a:t>
-            </a:r>
-            <a:r>
-              <a:rPr lang="en-US" i="1" dirty="0"/>
-              <a:t>not</a:t>
-            </a:r>
-            <a:r>
-              <a:rPr lang="en-US" dirty="0"/>
-              <a:t> run again.</a:t>
-            </a:r>
-          </a:p>
-          <a:p>
-            <a:r>
-              <a:rPr lang="en-US" dirty="0"/>
-              <a:t>If p1 is rejected, then p2 exits with an unhandled error.</a:t>
+              <a:t>makePromise1 in action</a:t>
             </a:r>
           </a:p>
         </p:txBody>
@@ -5382,7 +5329,7 @@
           <p:cNvPr id="4" name="Slide Number Placeholder 3">
             <a:extLst>
               <a:ext uri="{FF2B5EF4-FFF2-40B4-BE49-F238E27FC236}">
-                <a16:creationId xmlns:a16="http://schemas.microsoft.com/office/drawing/2014/main" id="{1784CB04-B37A-41E5-ACB5-CAC94E405CF5}"/>
+                <a16:creationId xmlns:a16="http://schemas.microsoft.com/office/drawing/2014/main" id="{E8183EB9-A636-4EDA-AB80-850DE53B4FAA}"/>
               </a:ext>
             </a:extLst>
           </p:cNvPr>
@@ -5406,16 +5353,671 @@
           </a:p>
         </p:txBody>
       </p:sp>
+      <p:sp>
+        <p:nvSpPr>
+          <p:cNvPr id="6" name="Rectangle 5">
+            <a:extLst>
+              <a:ext uri="{FF2B5EF4-FFF2-40B4-BE49-F238E27FC236}">
+                <a16:creationId xmlns:a16="http://schemas.microsoft.com/office/drawing/2014/main" id="{660AE397-4CD9-489A-BB03-DFA01C46A11D}"/>
+              </a:ext>
+            </a:extLst>
+          </p:cNvPr>
+          <p:cNvSpPr/>
+          <p:nvPr/>
+        </p:nvSpPr>
+        <p:spPr>
+          <a:xfrm>
+            <a:off x="6435865" y="2852178"/>
+            <a:ext cx="5645543" cy="1477328"/>
+          </a:xfrm>
+          <a:prstGeom prst="rect">
+            <a:avLst/>
+          </a:prstGeom>
+          <a:ln w="19050">
+            <a:solidFill>
+              <a:schemeClr val="tx1"/>
+            </a:solidFill>
+          </a:ln>
+        </p:spPr>
+        <p:txBody>
+          <a:bodyPr wrap="square">
+            <a:spAutoFit/>
+          </a:bodyPr>
+          <a:lstStyle/>
+          <a:p>
+            <a:r>
+              <a:rPr lang="en-US" dirty="0">
+                <a:latin typeface="Consolas" panose="020B0609020204030204" pitchFamily="49" charset="0"/>
+              </a:rPr>
+              <a:t>main handler starting</a:t>
+            </a:r>
+          </a:p>
+          <a:p>
+            <a:r>
+              <a:rPr lang="en-US" dirty="0">
+                <a:latin typeface="Consolas" panose="020B0609020204030204" pitchFamily="49" charset="0"/>
+              </a:rPr>
+              <a:t>creating new promise promise100</a:t>
+            </a:r>
+          </a:p>
+          <a:p>
+            <a:r>
+              <a:rPr lang="en-US" dirty="0">
+                <a:latin typeface="Consolas" panose="020B0609020204030204" pitchFamily="49" charset="0"/>
+              </a:rPr>
+              <a:t>main handler finished</a:t>
+            </a:r>
+          </a:p>
+          <a:p>
+            <a:r>
+              <a:rPr lang="en-US" dirty="0">
+                <a:latin typeface="Consolas" panose="020B0609020204030204" pitchFamily="49" charset="0"/>
+              </a:rPr>
+              <a:t>promise promise100 now running; flag = true</a:t>
+            </a:r>
+          </a:p>
+          <a:p>
+            <a:r>
+              <a:rPr lang="en-US" dirty="0">
+                <a:latin typeface="Consolas" panose="020B0609020204030204" pitchFamily="49" charset="0"/>
+              </a:rPr>
+              <a:t>promise promise100 now fulfilling with 10</a:t>
+            </a:r>
+          </a:p>
+        </p:txBody>
+      </p:sp>
+      <p:sp>
+        <p:nvSpPr>
+          <p:cNvPr id="7" name="Arrow: Right 6">
+            <a:extLst>
+              <a:ext uri="{FF2B5EF4-FFF2-40B4-BE49-F238E27FC236}">
+                <a16:creationId xmlns:a16="http://schemas.microsoft.com/office/drawing/2014/main" id="{AAFAEDF6-4BE2-4F6F-95D4-17BB68251EF1}"/>
+              </a:ext>
+            </a:extLst>
+          </p:cNvPr>
+          <p:cNvSpPr/>
+          <p:nvPr/>
+        </p:nvSpPr>
+        <p:spPr>
+          <a:xfrm>
+            <a:off x="6568086" y="2080850"/>
+            <a:ext cx="879231" cy="583809"/>
+          </a:xfrm>
+          <a:prstGeom prst="rightArrow">
+            <a:avLst/>
+          </a:prstGeom>
+          <a:solidFill>
+            <a:schemeClr val="accent1">
+              <a:lumMod val="40000"/>
+              <a:lumOff val="60000"/>
+            </a:schemeClr>
+          </a:solidFill>
+          <a:ln>
+            <a:solidFill>
+              <a:srgbClr val="0070C0"/>
+            </a:solidFill>
+          </a:ln>
+        </p:spPr>
+        <p:style>
+          <a:lnRef idx="2">
+            <a:schemeClr val="accent1">
+              <a:shade val="50000"/>
+            </a:schemeClr>
+          </a:lnRef>
+          <a:fillRef idx="1">
+            <a:schemeClr val="accent1"/>
+          </a:fillRef>
+          <a:effectRef idx="0">
+            <a:schemeClr val="accent1"/>
+          </a:effectRef>
+          <a:fontRef idx="minor">
+            <a:schemeClr val="lt1"/>
+          </a:fontRef>
+        </p:style>
+        <p:txBody>
+          <a:bodyPr rtlCol="0" anchor="ctr"/>
+          <a:lstStyle/>
+          <a:p>
+            <a:pPr algn="l"/>
+            <a:endParaRPr lang="en-US" dirty="0">
+              <a:solidFill>
+                <a:schemeClr val="tx1"/>
+              </a:solidFill>
+            </a:endParaRPr>
+          </a:p>
+        </p:txBody>
+      </p:sp>
+      <p:sp>
+        <p:nvSpPr>
+          <p:cNvPr id="8" name="Rectangle 7">
+            <a:extLst>
+              <a:ext uri="{FF2B5EF4-FFF2-40B4-BE49-F238E27FC236}">
+                <a16:creationId xmlns:a16="http://schemas.microsoft.com/office/drawing/2014/main" id="{132BFAAC-318C-43B9-9112-7D9B80D0AF09}"/>
+              </a:ext>
+            </a:extLst>
+          </p:cNvPr>
+          <p:cNvSpPr/>
+          <p:nvPr/>
+        </p:nvSpPr>
+        <p:spPr>
+          <a:xfrm>
+            <a:off x="838199" y="1720840"/>
+            <a:ext cx="6609117" cy="3416320"/>
+          </a:xfrm>
+          <a:prstGeom prst="rect">
+            <a:avLst/>
+          </a:prstGeom>
+        </p:spPr>
+        <p:txBody>
+          <a:bodyPr wrap="square">
+            <a:spAutoFit/>
+          </a:bodyPr>
+          <a:lstStyle/>
+          <a:p>
+            <a:r>
+              <a:rPr lang="en-US" dirty="0">
+                <a:solidFill>
+                  <a:srgbClr val="0000FF"/>
+                </a:solidFill>
+                <a:latin typeface="Consolas" panose="020B0609020204030204" pitchFamily="49" charset="0"/>
+              </a:rPr>
+              <a:t>import</a:t>
+            </a:r>
+            <a:r>
+              <a:rPr lang="en-US" dirty="0">
+                <a:solidFill>
+                  <a:srgbClr val="000000"/>
+                </a:solidFill>
+                <a:latin typeface="Consolas" panose="020B0609020204030204" pitchFamily="49" charset="0"/>
+              </a:rPr>
+              <a:t> makePromise1 </a:t>
+            </a:r>
+            <a:r>
+              <a:rPr lang="en-US" dirty="0">
+                <a:solidFill>
+                  <a:srgbClr val="0000FF"/>
+                </a:solidFill>
+                <a:latin typeface="Consolas" panose="020B0609020204030204" pitchFamily="49" charset="0"/>
+              </a:rPr>
+              <a:t>from</a:t>
+            </a:r>
+            <a:r>
+              <a:rPr lang="en-US" dirty="0">
+                <a:solidFill>
+                  <a:srgbClr val="000000"/>
+                </a:solidFill>
+                <a:latin typeface="Consolas" panose="020B0609020204030204" pitchFamily="49" charset="0"/>
+              </a:rPr>
+              <a:t> </a:t>
+            </a:r>
+            <a:r>
+              <a:rPr lang="en-US" dirty="0">
+                <a:solidFill>
+                  <a:srgbClr val="A31515"/>
+                </a:solidFill>
+                <a:latin typeface="Consolas" panose="020B0609020204030204" pitchFamily="49" charset="0"/>
+              </a:rPr>
+              <a:t>'./</a:t>
+            </a:r>
+            <a:r>
+              <a:rPr lang="en-US" dirty="0" err="1">
+                <a:solidFill>
+                  <a:srgbClr val="A31515"/>
+                </a:solidFill>
+                <a:latin typeface="Consolas" panose="020B0609020204030204" pitchFamily="49" charset="0"/>
+              </a:rPr>
+              <a:t>promiseMaker</a:t>
+            </a:r>
+            <a:r>
+              <a:rPr lang="en-US" dirty="0">
+                <a:solidFill>
+                  <a:srgbClr val="A31515"/>
+                </a:solidFill>
+                <a:latin typeface="Consolas" panose="020B0609020204030204" pitchFamily="49" charset="0"/>
+              </a:rPr>
+              <a:t>'</a:t>
+            </a:r>
+            <a:endParaRPr lang="en-US" dirty="0">
+              <a:solidFill>
+                <a:srgbClr val="000000"/>
+              </a:solidFill>
+              <a:latin typeface="Consolas" panose="020B0609020204030204" pitchFamily="49" charset="0"/>
+            </a:endParaRPr>
+          </a:p>
+          <a:p>
+            <a:br>
+              <a:rPr lang="en-US" dirty="0">
+                <a:solidFill>
+                  <a:srgbClr val="000000"/>
+                </a:solidFill>
+                <a:latin typeface="Consolas" panose="020B0609020204030204" pitchFamily="49" charset="0"/>
+              </a:rPr>
+            </a:br>
+            <a:r>
+              <a:rPr lang="en-US" dirty="0">
+                <a:solidFill>
+                  <a:srgbClr val="000000"/>
+                </a:solidFill>
+                <a:latin typeface="Consolas" panose="020B0609020204030204" pitchFamily="49" charset="0"/>
+              </a:rPr>
+              <a:t>console.log(</a:t>
+            </a:r>
+            <a:r>
+              <a:rPr lang="en-US" dirty="0">
+                <a:solidFill>
+                  <a:srgbClr val="A31515"/>
+                </a:solidFill>
+                <a:latin typeface="Consolas" panose="020B0609020204030204" pitchFamily="49" charset="0"/>
+              </a:rPr>
+              <a:t>"main handler starting"</a:t>
+            </a:r>
+            <a:r>
+              <a:rPr lang="en-US" dirty="0">
+                <a:solidFill>
+                  <a:srgbClr val="000000"/>
+                </a:solidFill>
+                <a:latin typeface="Consolas" panose="020B0609020204030204" pitchFamily="49" charset="0"/>
+              </a:rPr>
+              <a:t>)</a:t>
+            </a:r>
+          </a:p>
+          <a:p>
+            <a:br>
+              <a:rPr lang="en-US" dirty="0">
+                <a:solidFill>
+                  <a:srgbClr val="000000"/>
+                </a:solidFill>
+                <a:latin typeface="Consolas" panose="020B0609020204030204" pitchFamily="49" charset="0"/>
+              </a:rPr>
+            </a:br>
+            <a:r>
+              <a:rPr lang="en-US" dirty="0">
+                <a:solidFill>
+                  <a:srgbClr val="008000"/>
+                </a:solidFill>
+                <a:latin typeface="Consolas" panose="020B0609020204030204" pitchFamily="49" charset="0"/>
+              </a:rPr>
+              <a:t>// create a new promise, </a:t>
+            </a:r>
+          </a:p>
+          <a:p>
+            <a:r>
+              <a:rPr lang="en-US" dirty="0">
+                <a:solidFill>
+                  <a:srgbClr val="008000"/>
+                </a:solidFill>
+                <a:latin typeface="Consolas" panose="020B0609020204030204" pitchFamily="49" charset="0"/>
+              </a:rPr>
+              <a:t>// labeled "promise100",</a:t>
+            </a:r>
+            <a:endParaRPr lang="en-US" dirty="0">
+              <a:solidFill>
+                <a:srgbClr val="000000"/>
+              </a:solidFill>
+              <a:latin typeface="Consolas" panose="020B0609020204030204" pitchFamily="49" charset="0"/>
+            </a:endParaRPr>
+          </a:p>
+          <a:p>
+            <a:r>
+              <a:rPr lang="en-US" dirty="0">
+                <a:solidFill>
+                  <a:srgbClr val="008000"/>
+                </a:solidFill>
+                <a:latin typeface="Consolas" panose="020B0609020204030204" pitchFamily="49" charset="0"/>
+              </a:rPr>
+              <a:t>// and throw it in the pool</a:t>
+            </a:r>
+            <a:endParaRPr lang="en-US" dirty="0">
+              <a:solidFill>
+                <a:srgbClr val="000000"/>
+              </a:solidFill>
+              <a:latin typeface="Consolas" panose="020B0609020204030204" pitchFamily="49" charset="0"/>
+            </a:endParaRPr>
+          </a:p>
+          <a:p>
+            <a:r>
+              <a:rPr lang="en-US" dirty="0">
+                <a:solidFill>
+                  <a:srgbClr val="000000"/>
+                </a:solidFill>
+                <a:latin typeface="Consolas" panose="020B0609020204030204" pitchFamily="49" charset="0"/>
+              </a:rPr>
+              <a:t>makePromise1(</a:t>
+            </a:r>
+            <a:r>
+              <a:rPr lang="en-US" dirty="0">
+                <a:solidFill>
+                  <a:srgbClr val="A31515"/>
+                </a:solidFill>
+                <a:latin typeface="Consolas" panose="020B0609020204030204" pitchFamily="49" charset="0"/>
+              </a:rPr>
+              <a:t>"promise100"</a:t>
+            </a:r>
+            <a:r>
+              <a:rPr lang="en-US" dirty="0">
+                <a:solidFill>
+                  <a:srgbClr val="000000"/>
+                </a:solidFill>
+                <a:latin typeface="Consolas" panose="020B0609020204030204" pitchFamily="49" charset="0"/>
+              </a:rPr>
+              <a:t>,</a:t>
+            </a:r>
+            <a:r>
+              <a:rPr lang="en-US" dirty="0">
+                <a:solidFill>
+                  <a:srgbClr val="0000FF"/>
+                </a:solidFill>
+                <a:latin typeface="Consolas" panose="020B0609020204030204" pitchFamily="49" charset="0"/>
+              </a:rPr>
+              <a:t>true</a:t>
+            </a:r>
+            <a:r>
+              <a:rPr lang="en-US" dirty="0">
+                <a:solidFill>
+                  <a:srgbClr val="000000"/>
+                </a:solidFill>
+                <a:latin typeface="Consolas" panose="020B0609020204030204" pitchFamily="49" charset="0"/>
+              </a:rPr>
+              <a:t>,</a:t>
+            </a:r>
+            <a:r>
+              <a:rPr lang="en-US" dirty="0">
+                <a:solidFill>
+                  <a:srgbClr val="098658"/>
+                </a:solidFill>
+                <a:latin typeface="Consolas" panose="020B0609020204030204" pitchFamily="49" charset="0"/>
+              </a:rPr>
+              <a:t>10</a:t>
+            </a:r>
+            <a:r>
+              <a:rPr lang="en-US" dirty="0">
+                <a:solidFill>
+                  <a:srgbClr val="000000"/>
+                </a:solidFill>
+                <a:latin typeface="Consolas" panose="020B0609020204030204" pitchFamily="49" charset="0"/>
+              </a:rPr>
+              <a:t>)</a:t>
+            </a:r>
+          </a:p>
+          <a:p>
+            <a:br>
+              <a:rPr lang="en-US" dirty="0">
+                <a:solidFill>
+                  <a:srgbClr val="000000"/>
+                </a:solidFill>
+                <a:latin typeface="Consolas" panose="020B0609020204030204" pitchFamily="49" charset="0"/>
+              </a:rPr>
+            </a:br>
+            <a:r>
+              <a:rPr lang="en-US" dirty="0">
+                <a:solidFill>
+                  <a:srgbClr val="008000"/>
+                </a:solidFill>
+                <a:latin typeface="Consolas" panose="020B0609020204030204" pitchFamily="49" charset="0"/>
+              </a:rPr>
+              <a:t>// finish the main handler</a:t>
+            </a:r>
+            <a:endParaRPr lang="en-US" dirty="0">
+              <a:solidFill>
+                <a:srgbClr val="000000"/>
+              </a:solidFill>
+              <a:latin typeface="Consolas" panose="020B0609020204030204" pitchFamily="49" charset="0"/>
+            </a:endParaRPr>
+          </a:p>
+          <a:p>
+            <a:r>
+              <a:rPr lang="en-US" dirty="0">
+                <a:solidFill>
+                  <a:srgbClr val="000000"/>
+                </a:solidFill>
+                <a:latin typeface="Consolas" panose="020B0609020204030204" pitchFamily="49" charset="0"/>
+              </a:rPr>
+              <a:t>console.log(</a:t>
+            </a:r>
+            <a:r>
+              <a:rPr lang="en-US" dirty="0">
+                <a:solidFill>
+                  <a:srgbClr val="A31515"/>
+                </a:solidFill>
+                <a:latin typeface="Consolas" panose="020B0609020204030204" pitchFamily="49" charset="0"/>
+              </a:rPr>
+              <a:t>'main handler finished'</a:t>
+            </a:r>
+            <a:r>
+              <a:rPr lang="en-US" dirty="0">
+                <a:solidFill>
+                  <a:srgbClr val="000000"/>
+                </a:solidFill>
+                <a:latin typeface="Consolas" panose="020B0609020204030204" pitchFamily="49" charset="0"/>
+              </a:rPr>
+              <a:t>)</a:t>
+            </a:r>
+          </a:p>
+          <a:p>
+            <a:r>
+              <a:rPr lang="en-US" dirty="0">
+                <a:solidFill>
+                  <a:srgbClr val="008000"/>
+                </a:solidFill>
+                <a:latin typeface="Consolas" panose="020B0609020204030204" pitchFamily="49" charset="0"/>
+              </a:rPr>
+              <a:t>// and go on to run any handlers left in the pool</a:t>
+            </a:r>
+            <a:endParaRPr lang="en-US" b="0" dirty="0">
+              <a:solidFill>
+                <a:srgbClr val="000000"/>
+              </a:solidFill>
+              <a:effectLst/>
+              <a:latin typeface="Consolas" panose="020B0609020204030204" pitchFamily="49" charset="0"/>
+            </a:endParaRPr>
+          </a:p>
+        </p:txBody>
+      </p:sp>
+      <p:sp>
+        <p:nvSpPr>
+          <p:cNvPr id="9" name="TextBox 8">
+            <a:extLst>
+              <a:ext uri="{FF2B5EF4-FFF2-40B4-BE49-F238E27FC236}">
+                <a16:creationId xmlns:a16="http://schemas.microsoft.com/office/drawing/2014/main" id="{918F5F39-A61E-4C82-AE48-C1AFEF3216B5}"/>
+              </a:ext>
+            </a:extLst>
+          </p:cNvPr>
+          <p:cNvSpPr txBox="1"/>
+          <p:nvPr/>
+        </p:nvSpPr>
+        <p:spPr>
+          <a:xfrm>
+            <a:off x="8965602" y="300328"/>
+            <a:ext cx="1801391" cy="369332"/>
+          </a:xfrm>
+          <a:prstGeom prst="rect">
+            <a:avLst/>
+          </a:prstGeom>
+          <a:noFill/>
+          <a:ln>
+            <a:solidFill>
+              <a:srgbClr val="0070C0"/>
+            </a:solidFill>
+          </a:ln>
+        </p:spPr>
+        <p:style>
+          <a:lnRef idx="2">
+            <a:schemeClr val="accent1">
+              <a:shade val="50000"/>
+            </a:schemeClr>
+          </a:lnRef>
+          <a:fillRef idx="1">
+            <a:schemeClr val="accent1"/>
+          </a:fillRef>
+          <a:effectRef idx="0">
+            <a:schemeClr val="accent1"/>
+          </a:effectRef>
+          <a:fontRef idx="minor">
+            <a:schemeClr val="lt1"/>
+          </a:fontRef>
+        </p:style>
+        <p:txBody>
+          <a:bodyPr rot="0" spcFirstLastPara="0" vertOverflow="overflow" horzOverflow="overflow" vert="horz" wrap="none" lIns="91440" tIns="45720" rIns="91440" bIns="45720" numCol="1" spcCol="0" rtlCol="0" fromWordArt="0" anchor="ctr" anchorCtr="0" forceAA="0" compatLnSpc="1">
+            <a:prstTxWarp prst="textNoShape">
+              <a:avLst/>
+            </a:prstTxWarp>
+            <a:spAutoFit/>
+          </a:bodyPr>
+          <a:lstStyle/>
+          <a:p>
+            <a:pPr algn="l"/>
+            <a:r>
+              <a:rPr lang="en-US" dirty="0">
+                <a:solidFill>
+                  <a:schemeClr val="tx1"/>
+                </a:solidFill>
+              </a:rPr>
+              <a:t>4.1/example1a.ts</a:t>
+            </a:r>
+          </a:p>
+        </p:txBody>
+      </p:sp>
     </p:spTree>
     <p:extLst>
       <p:ext uri="{BB962C8B-B14F-4D97-AF65-F5344CB8AC3E}">
-        <p14:creationId xmlns:p14="http://schemas.microsoft.com/office/powerpoint/2010/main" val="3140688273"/>
+        <p14:creationId xmlns:p14="http://schemas.microsoft.com/office/powerpoint/2010/main" val="1921561000"/>
       </p:ext>
     </p:extLst>
   </p:cSld>
   <p:clrMapOvr>
     <a:masterClrMapping/>
   </p:clrMapOvr>
+  <p:timing>
+    <p:tnLst>
+      <p:par>
+        <p:cTn id="1" dur="indefinite" restart="never" nodeType="tmRoot">
+          <p:childTnLst>
+            <p:seq concurrent="1" nextAc="seek">
+              <p:cTn id="2" dur="indefinite" nodeType="mainSeq">
+                <p:childTnLst>
+                  <p:par>
+                    <p:cTn id="3" fill="hold">
+                      <p:stCondLst>
+                        <p:cond delay="indefinite"/>
+                      </p:stCondLst>
+                      <p:childTnLst>
+                        <p:par>
+                          <p:cTn id="4" fill="hold">
+                            <p:stCondLst>
+                              <p:cond delay="0"/>
+                            </p:stCondLst>
+                            <p:childTnLst>
+                              <p:par>
+                                <p:cTn id="5" presetID="10" presetClass="entr" presetSubtype="0" fill="hold" grpId="0" nodeType="clickEffect">
+                                  <p:stCondLst>
+                                    <p:cond delay="0"/>
+                                  </p:stCondLst>
+                                  <p:childTnLst>
+                                    <p:set>
+                                      <p:cBhvr>
+                                        <p:cTn id="6" dur="1" fill="hold">
+                                          <p:stCondLst>
+                                            <p:cond delay="0"/>
+                                          </p:stCondLst>
+                                        </p:cTn>
+                                        <p:tgtEl>
+                                          <p:spTgt spid="7"/>
+                                        </p:tgtEl>
+                                        <p:attrNameLst>
+                                          <p:attrName>style.visibility</p:attrName>
+                                        </p:attrNameLst>
+                                      </p:cBhvr>
+                                      <p:to>
+                                        <p:strVal val="visible"/>
+                                      </p:to>
+                                    </p:set>
+                                    <p:animEffect transition="in" filter="fade">
+                                      <p:cBhvr>
+                                        <p:cTn id="7" dur="500"/>
+                                        <p:tgtEl>
+                                          <p:spTgt spid="7"/>
+                                        </p:tgtEl>
+                                      </p:cBhvr>
+                                    </p:animEffect>
+                                  </p:childTnLst>
+                                </p:cTn>
+                              </p:par>
+                            </p:childTnLst>
+                          </p:cTn>
+                        </p:par>
+                        <p:par>
+                          <p:cTn id="8" fill="hold">
+                            <p:stCondLst>
+                              <p:cond delay="500"/>
+                            </p:stCondLst>
+                            <p:childTnLst>
+                              <p:par>
+                                <p:cTn id="9" presetID="10" presetClass="entr" presetSubtype="0" fill="hold" grpId="0" nodeType="afterEffect">
+                                  <p:stCondLst>
+                                    <p:cond delay="500"/>
+                                  </p:stCondLst>
+                                  <p:childTnLst>
+                                    <p:set>
+                                      <p:cBhvr>
+                                        <p:cTn id="10" dur="1" fill="hold">
+                                          <p:stCondLst>
+                                            <p:cond delay="0"/>
+                                          </p:stCondLst>
+                                        </p:cTn>
+                                        <p:tgtEl>
+                                          <p:spTgt spid="6"/>
+                                        </p:tgtEl>
+                                        <p:attrNameLst>
+                                          <p:attrName>style.visibility</p:attrName>
+                                        </p:attrNameLst>
+                                      </p:cBhvr>
+                                      <p:to>
+                                        <p:strVal val="visible"/>
+                                      </p:to>
+                                    </p:set>
+                                    <p:animEffect transition="in" filter="fade">
+                                      <p:cBhvr>
+                                        <p:cTn id="11" dur="500"/>
+                                        <p:tgtEl>
+                                          <p:spTgt spid="6"/>
+                                        </p:tgtEl>
+                                      </p:cBhvr>
+                                    </p:animEffect>
+                                  </p:childTnLst>
+                                </p:cTn>
+                              </p:par>
+                            </p:childTnLst>
+                          </p:cTn>
+                        </p:par>
+                      </p:childTnLst>
+                    </p:cTn>
+                  </p:par>
+                </p:childTnLst>
+              </p:cTn>
+              <p:prevCondLst>
+                <p:cond evt="onPrev" delay="0">
+                  <p:tgtEl>
+                    <p:sldTgt/>
+                  </p:tgtEl>
+                </p:cond>
+              </p:prevCondLst>
+              <p:nextCondLst>
+                <p:cond evt="onNext" delay="0">
+                  <p:tgtEl>
+                    <p:sldTgt/>
+                  </p:tgtEl>
+                </p:cond>
+              </p:nextCondLst>
+            </p:seq>
+          </p:childTnLst>
+        </p:cTn>
+      </p:par>
+    </p:tnLst>
+    <p:bldLst>
+      <p:bldP spid="6" grpId="0" animBg="1"/>
+      <p:bldP spid="7" grpId="0" animBg="1"/>
+    </p:bldLst>
+  </p:timing>
 </p:sld>
 </file>
 
@@ -5441,7 +6043,7 @@
           <p:cNvPr id="2" name="Title 1">
             <a:extLst>
               <a:ext uri="{FF2B5EF4-FFF2-40B4-BE49-F238E27FC236}">
-                <a16:creationId xmlns:a16="http://schemas.microsoft.com/office/drawing/2014/main" id="{79E03FDA-6383-4728-BD83-8EAB1C7D9049}"/>
+                <a16:creationId xmlns:a16="http://schemas.microsoft.com/office/drawing/2014/main" id="{CB681681-DC3F-4C82-8A29-BDDAACCA6A4D}"/>
               </a:ext>
             </a:extLst>
           </p:cNvPr>
@@ -5459,7 +6061,82 @@
           <a:p>
             <a:r>
               <a:rPr lang="en-US" dirty="0"/>
-              <a:t>Linking event handlers</a:t>
+              <a:t>Extending promises with callbacks</a:t>
+            </a:r>
+          </a:p>
+        </p:txBody>
+      </p:sp>
+      <p:sp>
+        <p:nvSpPr>
+          <p:cNvPr id="3" name="Content Placeholder 2">
+            <a:extLst>
+              <a:ext uri="{FF2B5EF4-FFF2-40B4-BE49-F238E27FC236}">
+                <a16:creationId xmlns:a16="http://schemas.microsoft.com/office/drawing/2014/main" id="{A9A6AF18-5562-413A-AAC0-CC3469FE5B5B}"/>
+              </a:ext>
+            </a:extLst>
+          </p:cNvPr>
+          <p:cNvSpPr>
+            <a:spLocks noGrp="1"/>
+          </p:cNvSpPr>
+          <p:nvPr>
+            <p:ph idx="1"/>
+          </p:nvPr>
+        </p:nvSpPr>
+        <p:spPr>
+          <a:xfrm>
+            <a:off x="838200" y="1500160"/>
+            <a:ext cx="7887346" cy="4856190"/>
+          </a:xfrm>
+        </p:spPr>
+        <p:txBody>
+          <a:bodyPr>
+            <a:normAutofit/>
+          </a:bodyPr>
+          <a:lstStyle/>
+          <a:p>
+            <a:r>
+              <a:rPr lang="en-US" dirty="0"/>
+              <a:t>const p2 = p1.then(callback) creates a new promise that represents the result of promise p1 followed by the callback (if p1 fulfills)</a:t>
+            </a:r>
+          </a:p>
+          <a:p>
+            <a:r>
+              <a:rPr lang="en-US" dirty="0"/>
+              <a:t>This is a </a:t>
+            </a:r>
+            <a:r>
+              <a:rPr lang="en-US" i="1" dirty="0"/>
+              <a:t>new</a:t>
+            </a:r>
+            <a:r>
+              <a:rPr lang="en-US" dirty="0"/>
+              <a:t> promise.  </a:t>
+            </a:r>
+          </a:p>
+          <a:p>
+            <a:r>
+              <a:rPr lang="en-US" dirty="0"/>
+              <a:t>p2 is ready when p1 is completed (either fulfilled or rejected)</a:t>
+            </a:r>
+          </a:p>
+          <a:p>
+            <a:r>
+              <a:rPr lang="en-US" dirty="0"/>
+              <a:t>When p2 is run, it refers to p1.  If p1 was fulfilled, its value is passed to the callback, and p2 completes normally. p1 is </a:t>
+            </a:r>
+            <a:r>
+              <a:rPr lang="en-US" i="1" dirty="0"/>
+              <a:t>not</a:t>
+            </a:r>
+            <a:r>
+              <a:rPr lang="en-US" dirty="0"/>
+              <a:t> run again.</a:t>
+            </a:r>
+          </a:p>
+          <a:p>
+            <a:r>
+              <a:rPr lang="en-US" dirty="0"/>
+              <a:t>If p1 was rejected, then p2 exits with an unhandled error.</a:t>
             </a:r>
           </a:p>
         </p:txBody>
@@ -5469,7 +6146,7 @@
           <p:cNvPr id="4" name="Slide Number Placeholder 3">
             <a:extLst>
               <a:ext uri="{FF2B5EF4-FFF2-40B4-BE49-F238E27FC236}">
-                <a16:creationId xmlns:a16="http://schemas.microsoft.com/office/drawing/2014/main" id="{F46D941E-5690-4135-8AD5-61B1599A217E}"/>
+                <a16:creationId xmlns:a16="http://schemas.microsoft.com/office/drawing/2014/main" id="{1784CB04-B37A-41E5-ACB5-CAC94E405CF5}"/>
               </a:ext>
             </a:extLst>
           </p:cNvPr>
@@ -5488,6 +6165,93 @@
             <a:fld id="{20F37917-FD3A-4669-9018-DA04BCDD3D75}" type="slidenum">
               <a:rPr lang="en-US" smtClean="0"/>
               <a:t>13</a:t>
+            </a:fld>
+            <a:endParaRPr lang="en-US"/>
+          </a:p>
+        </p:txBody>
+      </p:sp>
+    </p:spTree>
+    <p:extLst>
+      <p:ext uri="{BB962C8B-B14F-4D97-AF65-F5344CB8AC3E}">
+        <p14:creationId xmlns:p14="http://schemas.microsoft.com/office/powerpoint/2010/main" val="3140688273"/>
+      </p:ext>
+    </p:extLst>
+  </p:cSld>
+  <p:clrMapOvr>
+    <a:masterClrMapping/>
+  </p:clrMapOvr>
+</p:sld>
+</file>
+
+<file path=ppt/slides/slide14.xml><?xml version="1.0" encoding="utf-8"?>
+<p:sld xmlns:a="http://schemas.openxmlformats.org/drawingml/2006/main" xmlns:r="http://schemas.openxmlformats.org/officeDocument/2006/relationships" xmlns:p="http://schemas.openxmlformats.org/presentationml/2006/main">
+  <p:cSld>
+    <p:spTree>
+      <p:nvGrpSpPr>
+        <p:cNvPr id="1" name=""/>
+        <p:cNvGrpSpPr/>
+        <p:nvPr/>
+      </p:nvGrpSpPr>
+      <p:grpSpPr>
+        <a:xfrm>
+          <a:off x="0" y="0"/>
+          <a:ext cx="0" cy="0"/>
+          <a:chOff x="0" y="0"/>
+          <a:chExt cx="0" cy="0"/>
+        </a:xfrm>
+      </p:grpSpPr>
+      <p:sp>
+        <p:nvSpPr>
+          <p:cNvPr id="2" name="Title 1">
+            <a:extLst>
+              <a:ext uri="{FF2B5EF4-FFF2-40B4-BE49-F238E27FC236}">
+                <a16:creationId xmlns:a16="http://schemas.microsoft.com/office/drawing/2014/main" id="{79E03FDA-6383-4728-BD83-8EAB1C7D9049}"/>
+              </a:ext>
+            </a:extLst>
+          </p:cNvPr>
+          <p:cNvSpPr>
+            <a:spLocks noGrp="1"/>
+          </p:cNvSpPr>
+          <p:nvPr>
+            <p:ph type="title"/>
+          </p:nvPr>
+        </p:nvSpPr>
+        <p:spPr/>
+        <p:txBody>
+          <a:bodyPr/>
+          <a:lstStyle/>
+          <a:p>
+            <a:r>
+              <a:rPr lang="en-US" dirty="0"/>
+              <a:t>Linking event handlers</a:t>
+            </a:r>
+          </a:p>
+        </p:txBody>
+      </p:sp>
+      <p:sp>
+        <p:nvSpPr>
+          <p:cNvPr id="4" name="Slide Number Placeholder 3">
+            <a:extLst>
+              <a:ext uri="{FF2B5EF4-FFF2-40B4-BE49-F238E27FC236}">
+                <a16:creationId xmlns:a16="http://schemas.microsoft.com/office/drawing/2014/main" id="{F46D941E-5690-4135-8AD5-61B1599A217E}"/>
+              </a:ext>
+            </a:extLst>
+          </p:cNvPr>
+          <p:cNvSpPr>
+            <a:spLocks noGrp="1"/>
+          </p:cNvSpPr>
+          <p:nvPr>
+            <p:ph type="sldNum" sz="quarter" idx="12"/>
+          </p:nvPr>
+        </p:nvSpPr>
+        <p:spPr/>
+        <p:txBody>
+          <a:bodyPr/>
+          <a:lstStyle/>
+          <a:p>
+            <a:fld id="{20F37917-FD3A-4669-9018-DA04BCDD3D75}" type="slidenum">
+              <a:rPr lang="en-US" smtClean="0"/>
+              <a:t>14</a:t>
             </a:fld>
             <a:endParaRPr lang="en-US"/>
           </a:p>
@@ -6364,7 +7128,7 @@
         <p:spPr>
           <a:xfrm>
             <a:off x="4482988" y="1675051"/>
-            <a:ext cx="4361607" cy="1812616"/>
+            <a:ext cx="4362007" cy="1812616"/>
           </a:xfrm>
           <a:custGeom>
             <a:avLst/>
@@ -6376,6 +7140,38 @@
               <a:gd name="connsiteX2" fmla="*/ 1286633 w 4361607"/>
               <a:gd name="connsiteY2" fmla="*/ 1480843 h 1812616"/>
               <a:gd name="connsiteX3" fmla="*/ 0 w 4361607"/>
+              <a:gd name="connsiteY3" fmla="*/ 1812616 h 1812616"/>
+              <a:gd name="connsiteX0" fmla="*/ 4361607 w 4361903"/>
+              <a:gd name="connsiteY0" fmla="*/ 0 h 1812616"/>
+              <a:gd name="connsiteX1" fmla="*/ 2233401 w 4361903"/>
+              <a:gd name="connsiteY1" fmla="*/ 623087 h 1812616"/>
+              <a:gd name="connsiteX2" fmla="*/ 1286633 w 4361903"/>
+              <a:gd name="connsiteY2" fmla="*/ 1480843 h 1812616"/>
+              <a:gd name="connsiteX3" fmla="*/ 0 w 4361903"/>
+              <a:gd name="connsiteY3" fmla="*/ 1812616 h 1812616"/>
+              <a:gd name="connsiteX0" fmla="*/ 4361607 w 4361903"/>
+              <a:gd name="connsiteY0" fmla="*/ 0 h 1812616"/>
+              <a:gd name="connsiteX1" fmla="*/ 2233401 w 4361903"/>
+              <a:gd name="connsiteY1" fmla="*/ 623087 h 1812616"/>
+              <a:gd name="connsiteX2" fmla="*/ 1286633 w 4361903"/>
+              <a:gd name="connsiteY2" fmla="*/ 1480843 h 1812616"/>
+              <a:gd name="connsiteX3" fmla="*/ 0 w 4361903"/>
+              <a:gd name="connsiteY3" fmla="*/ 1812616 h 1812616"/>
+              <a:gd name="connsiteX0" fmla="*/ 4361607 w 4362047"/>
+              <a:gd name="connsiteY0" fmla="*/ 0 h 1812616"/>
+              <a:gd name="connsiteX1" fmla="*/ 2775568 w 4362047"/>
+              <a:gd name="connsiteY1" fmla="*/ 542167 h 1812616"/>
+              <a:gd name="connsiteX2" fmla="*/ 1286633 w 4362047"/>
+              <a:gd name="connsiteY2" fmla="*/ 1480843 h 1812616"/>
+              <a:gd name="connsiteX3" fmla="*/ 0 w 4362047"/>
+              <a:gd name="connsiteY3" fmla="*/ 1812616 h 1812616"/>
+              <a:gd name="connsiteX0" fmla="*/ 4361607 w 4362007"/>
+              <a:gd name="connsiteY0" fmla="*/ 0 h 1812616"/>
+              <a:gd name="connsiteX1" fmla="*/ 2775568 w 4362007"/>
+              <a:gd name="connsiteY1" fmla="*/ 542167 h 1812616"/>
+              <a:gd name="connsiteX2" fmla="*/ 1958272 w 4362007"/>
+              <a:gd name="connsiteY2" fmla="*/ 1594131 h 1812616"/>
+              <a:gd name="connsiteX3" fmla="*/ 0 w 4362007"/>
               <a:gd name="connsiteY3" fmla="*/ 1812616 h 1812616"/>
             </a:gdLst>
             <a:ahLst/>
@@ -6395,23 +7191,23 @@
             </a:cxnLst>
             <a:rect l="l" t="t" r="r" b="b"/>
             <a:pathLst>
-              <a:path w="4361607" h="1812616">
+              <a:path w="4362007" h="1812616">
                 <a:moveTo>
                   <a:pt x="4361607" y="0"/>
                 </a:moveTo>
                 <a:cubicBezTo>
-                  <a:pt x="3553752" y="188140"/>
-                  <a:pt x="2745897" y="376280"/>
-                  <a:pt x="2233401" y="623087"/>
+                  <a:pt x="4387232" y="859779"/>
+                  <a:pt x="3176124" y="276479"/>
+                  <a:pt x="2775568" y="542167"/>
                 </a:cubicBezTo>
                 <a:cubicBezTo>
-                  <a:pt x="1720905" y="869894"/>
-                  <a:pt x="1658866" y="1282588"/>
-                  <a:pt x="1286633" y="1480843"/>
+                  <a:pt x="2375012" y="807855"/>
+                  <a:pt x="2330505" y="1395876"/>
+                  <a:pt x="1958272" y="1594131"/>
                 </a:cubicBezTo>
                 <a:cubicBezTo>
-                  <a:pt x="914400" y="1679098"/>
-                  <a:pt x="457200" y="1745857"/>
+                  <a:pt x="1586039" y="1792386"/>
+                  <a:pt x="950814" y="1810593"/>
                   <a:pt x="0" y="1812616"/>
                 </a:cubicBezTo>
               </a:path>
@@ -6461,10 +7257,133 @@
   <p:clrMapOvr>
     <a:masterClrMapping/>
   </p:clrMapOvr>
+  <p:timing>
+    <p:tnLst>
+      <p:par>
+        <p:cTn id="1" dur="indefinite" restart="never" nodeType="tmRoot">
+          <p:childTnLst>
+            <p:seq concurrent="1" nextAc="seek">
+              <p:cTn id="2" dur="indefinite" nodeType="mainSeq">
+                <p:childTnLst>
+                  <p:par>
+                    <p:cTn id="3" fill="hold">
+                      <p:stCondLst>
+                        <p:cond delay="indefinite"/>
+                      </p:stCondLst>
+                      <p:childTnLst>
+                        <p:par>
+                          <p:cTn id="4" fill="hold">
+                            <p:stCondLst>
+                              <p:cond delay="0"/>
+                            </p:stCondLst>
+                            <p:childTnLst>
+                              <p:par>
+                                <p:cTn id="5" presetID="1" presetClass="entr" presetSubtype="0" fill="hold" grpId="0" nodeType="clickEffect">
+                                  <p:stCondLst>
+                                    <p:cond delay="0"/>
+                                  </p:stCondLst>
+                                  <p:childTnLst>
+                                    <p:set>
+                                      <p:cBhvr>
+                                        <p:cTn id="6" dur="1" fill="hold">
+                                          <p:stCondLst>
+                                            <p:cond delay="0"/>
+                                          </p:stCondLst>
+                                        </p:cTn>
+                                        <p:tgtEl>
+                                          <p:spTgt spid="10"/>
+                                        </p:tgtEl>
+                                        <p:attrNameLst>
+                                          <p:attrName>style.visibility</p:attrName>
+                                        </p:attrNameLst>
+                                      </p:cBhvr>
+                                      <p:to>
+                                        <p:strVal val="visible"/>
+                                      </p:to>
+                                    </p:set>
+                                  </p:childTnLst>
+                                </p:cTn>
+                              </p:par>
+                            </p:childTnLst>
+                          </p:cTn>
+                        </p:par>
+                        <p:par>
+                          <p:cTn id="7" fill="hold">
+                            <p:stCondLst>
+                              <p:cond delay="0"/>
+                            </p:stCondLst>
+                            <p:childTnLst>
+                              <p:par>
+                                <p:cTn id="8" presetID="10" presetClass="entr" presetSubtype="0" fill="hold" grpId="0" nodeType="afterEffect">
+                                  <p:stCondLst>
+                                    <p:cond delay="500"/>
+                                  </p:stCondLst>
+                                  <p:childTnLst>
+                                    <p:set>
+                                      <p:cBhvr>
+                                        <p:cTn id="9" dur="1" fill="hold">
+                                          <p:stCondLst>
+                                            <p:cond delay="0"/>
+                                          </p:stCondLst>
+                                        </p:cTn>
+                                        <p:tgtEl>
+                                          <p:spTgt spid="9"/>
+                                        </p:tgtEl>
+                                        <p:attrNameLst>
+                                          <p:attrName>style.visibility</p:attrName>
+                                        </p:attrNameLst>
+                                      </p:cBhvr>
+                                      <p:to>
+                                        <p:strVal val="visible"/>
+                                      </p:to>
+                                    </p:set>
+                                    <p:animEffect transition="in" filter="fade">
+                                      <p:cBhvr>
+                                        <p:cTn id="10" dur="750"/>
+                                        <p:tgtEl>
+                                          <p:spTgt spid="9"/>
+                                        </p:tgtEl>
+                                      </p:cBhvr>
+                                    </p:animEffect>
+                                  </p:childTnLst>
+                                </p:cTn>
+                              </p:par>
+                            </p:childTnLst>
+                          </p:cTn>
+                        </p:par>
+                      </p:childTnLst>
+                    </p:cTn>
+                  </p:par>
+                </p:childTnLst>
+              </p:cTn>
+              <p:prevCondLst>
+                <p:cond evt="onPrev" delay="0">
+                  <p:tgtEl>
+                    <p:sldTgt/>
+                  </p:tgtEl>
+                </p:cond>
+              </p:prevCondLst>
+              <p:nextCondLst>
+                <p:cond evt="onNext" delay="0">
+                  <p:tgtEl>
+                    <p:sldTgt/>
+                  </p:tgtEl>
+                </p:cond>
+              </p:nextCondLst>
+            </p:seq>
+          </p:childTnLst>
+        </p:cTn>
+      </p:par>
+    </p:tnLst>
+    <p:bldLst>
+      <p:bldP spid="9" grpId="0" animBg="1"/>
+      <p:bldP spid="10" grpId="0" animBg="1"/>
+    </p:bldLst>
+  </p:timing>
 </p:sld>
 </file>
 
-<file path=ppt/slides/slide14.xml><?xml version="1.0" encoding="utf-8"?>
+<file path=ppt/slides/slide15.xml><?xml version="1.0" encoding="utf-8"?>
 <p:sld xmlns:a="http://schemas.openxmlformats.org/drawingml/2006/main" xmlns:r="http://schemas.openxmlformats.org/officeDocument/2006/relationships" xmlns:p="http://schemas.openxmlformats.org/presentationml/2006/main">
   <p:cSld>
     <p:spTree>
@@ -6540,7 +7459,7 @@
           <a:p>
             <a:fld id="{20F37917-FD3A-4669-9018-DA04BCDD3D75}" type="slidenum">
               <a:rPr lang="en-US" smtClean="0"/>
-              <a:t>14</a:t>
+              <a:t>15</a:t>
             </a:fld>
             <a:endParaRPr lang="en-US"/>
           </a:p>
@@ -6561,7 +7480,7 @@
         <p:spPr>
           <a:xfrm>
             <a:off x="838200" y="1494877"/>
-            <a:ext cx="7472320" cy="5078313"/>
+            <a:ext cx="7472320" cy="5355312"/>
           </a:xfrm>
           <a:prstGeom prst="rect">
             <a:avLst/>
@@ -6872,7 +7791,7 @@
                 </a:solidFill>
                 <a:latin typeface="Consolas" panose="020B0609020204030204" pitchFamily="49" charset="0"/>
               </a:rPr>
-              <a:t>// p3 results in an unhandled error</a:t>
+              <a:t>// p3 completes without running the callback</a:t>
             </a:r>
             <a:endParaRPr lang="en-US" dirty="0">
               <a:solidFill>
@@ -7003,7 +7922,18 @@
                 </a:solidFill>
                 <a:latin typeface="Consolas" panose="020B0609020204030204" pitchFamily="49" charset="0"/>
               </a:rPr>
-              <a:t>// and p4 is never run</a:t>
+              <a:t>// and p4 similarly completes without running its</a:t>
+            </a:r>
+          </a:p>
+          <a:p>
+            <a:r>
+              <a:rPr lang="en-US" dirty="0">
+                <a:solidFill>
+                  <a:srgbClr val="008000"/>
+                </a:solidFill>
+                <a:latin typeface="Consolas" panose="020B0609020204030204" pitchFamily="49" charset="0"/>
+              </a:rPr>
+              <a:t>// callback, so it completes with an unhandled exception</a:t>
             </a:r>
             <a:endParaRPr lang="en-US" dirty="0">
               <a:solidFill>
@@ -7213,7 +8143,7 @@
 </p:sld>
 </file>
 
-<file path=ppt/slides/slide15.xml><?xml version="1.0" encoding="utf-8"?>
+<file path=ppt/slides/slide16.xml><?xml version="1.0" encoding="utf-8"?>
 <p:sld xmlns:a="http://schemas.openxmlformats.org/drawingml/2006/main" xmlns:r="http://schemas.openxmlformats.org/officeDocument/2006/relationships" xmlns:p="http://schemas.openxmlformats.org/presentationml/2006/main">
   <p:cSld>
     <p:spTree>
@@ -7289,7 +8219,7 @@
           <a:p>
             <a:fld id="{20F37917-FD3A-4669-9018-DA04BCDD3D75}" type="slidenum">
               <a:rPr lang="en-US" smtClean="0"/>
-              <a:t>15</a:t>
+              <a:t>16</a:t>
             </a:fld>
             <a:endParaRPr lang="en-US"/>
           </a:p>
@@ -8177,7 +9107,7 @@
 </p:sld>
 </file>
 
-<file path=ppt/slides/slide16.xml><?xml version="1.0" encoding="utf-8"?>
+<file path=ppt/slides/slide17.xml><?xml version="1.0" encoding="utf-8"?>
 <p:sld xmlns:a="http://schemas.openxmlformats.org/drawingml/2006/main" xmlns:r="http://schemas.openxmlformats.org/officeDocument/2006/relationships" xmlns:p="http://schemas.openxmlformats.org/presentationml/2006/main">
   <p:cSld>
     <p:spTree>
@@ -8245,7 +9175,7 @@
           <a:p>
             <a:fld id="{20F37917-FD3A-4669-9018-DA04BCDD3D75}" type="slidenum">
               <a:rPr lang="en-US" smtClean="0"/>
-              <a:t>16</a:t>
+              <a:t>17</a:t>
             </a:fld>
             <a:endParaRPr lang="en-US"/>
           </a:p>
@@ -9229,7 +10159,7 @@
 </p:sld>
 </file>
 
-<file path=ppt/slides/slide17.xml><?xml version="1.0" encoding="utf-8"?>
+<file path=ppt/slides/slide18.xml><?xml version="1.0" encoding="utf-8"?>
 <p:sld xmlns:a="http://schemas.openxmlformats.org/drawingml/2006/main" xmlns:r="http://schemas.openxmlformats.org/officeDocument/2006/relationships" xmlns:p="http://schemas.openxmlformats.org/presentationml/2006/main">
   <p:cSld>
     <p:spTree>
@@ -9298,7 +10228,7 @@
             <a:fld id="{20F37917-FD3A-4669-9018-DA04BCDD3D75}" type="slidenum">
               <a:rPr lang="en-US" smtClean="0"/>
               <a:pPr/>
-              <a:t>17</a:t>
+              <a:t>18</a:t>
             </a:fld>
             <a:endParaRPr lang="en-US"/>
           </a:p>
@@ -10167,7 +11097,7 @@
 </p:sld>
 </file>
 
-<file path=ppt/slides/slide18.xml><?xml version="1.0" encoding="utf-8"?>
+<file path=ppt/slides/slide19.xml><?xml version="1.0" encoding="utf-8"?>
 <p:sld xmlns:a="http://schemas.openxmlformats.org/drawingml/2006/main" xmlns:r="http://schemas.openxmlformats.org/officeDocument/2006/relationships" xmlns:p="http://schemas.openxmlformats.org/presentationml/2006/main">
   <p:cSld>
     <p:spTree>
@@ -10237,7 +11167,7 @@
           <a:p>
             <a:fld id="{20F37917-FD3A-4669-9018-DA04BCDD3D75}" type="slidenum">
               <a:rPr lang="en-US" smtClean="0"/>
-              <a:t>18</a:t>
+              <a:t>19</a:t>
             </a:fld>
             <a:endParaRPr lang="en-US"/>
           </a:p>
@@ -11156,6 +12086,9 @@
                 <a:solidFill>
                   <a:srgbClr val="000000"/>
                 </a:solidFill>
+                <a:highlight>
+                  <a:srgbClr val="FFFF00"/>
+                </a:highlight>
                 <a:latin typeface="Consolas" panose="020B0609020204030204" pitchFamily="49" charset="0"/>
               </a:rPr>
               <a:t>Promise.all</a:t>
@@ -11165,6 +12098,9 @@
                 <a:solidFill>
                   <a:srgbClr val="000000"/>
                 </a:solidFill>
+                <a:highlight>
+                  <a:srgbClr val="FFFF00"/>
+                </a:highlight>
                 <a:latin typeface="Consolas" panose="020B0609020204030204" pitchFamily="49" charset="0"/>
               </a:rPr>
               <a:t>([p4,p3])</a:t>
@@ -11532,162 +12468,6 @@
 </p:sld>
 </file>
 
-<file path=ppt/slides/slide19.xml><?xml version="1.0" encoding="utf-8"?>
-<p:sld xmlns:a="http://schemas.openxmlformats.org/drawingml/2006/main" xmlns:r="http://schemas.openxmlformats.org/officeDocument/2006/relationships" xmlns:p="http://schemas.openxmlformats.org/presentationml/2006/main">
-  <p:cSld>
-    <p:spTree>
-      <p:nvGrpSpPr>
-        <p:cNvPr id="1" name=""/>
-        <p:cNvGrpSpPr/>
-        <p:nvPr/>
-      </p:nvGrpSpPr>
-      <p:grpSpPr>
-        <a:xfrm>
-          <a:off x="0" y="0"/>
-          <a:ext cx="0" cy="0"/>
-          <a:chOff x="0" y="0"/>
-          <a:chExt cx="0" cy="0"/>
-        </a:xfrm>
-      </p:grpSpPr>
-      <p:sp>
-        <p:nvSpPr>
-          <p:cNvPr id="2" name="Title 1">
-            <a:extLst>
-              <a:ext uri="{FF2B5EF4-FFF2-40B4-BE49-F238E27FC236}">
-                <a16:creationId xmlns:a16="http://schemas.microsoft.com/office/drawing/2014/main" id="{B6D33575-0593-49FD-831F-131BB6CC7E6C}"/>
-              </a:ext>
-            </a:extLst>
-          </p:cNvPr>
-          <p:cNvSpPr>
-            <a:spLocks noGrp="1"/>
-          </p:cNvSpPr>
-          <p:nvPr>
-            <p:ph type="title"/>
-          </p:nvPr>
-        </p:nvSpPr>
-        <p:spPr/>
-        <p:txBody>
-          <a:bodyPr/>
-          <a:lstStyle/>
-          <a:p>
-            <a:r>
-              <a:rPr lang="en-US" dirty="0"/>
-              <a:t>Review: Learning Objectives for this Lesson</a:t>
-            </a:r>
-          </a:p>
-        </p:txBody>
-      </p:sp>
-      <p:sp>
-        <p:nvSpPr>
-          <p:cNvPr id="3" name="Text Placeholder 2">
-            <a:extLst>
-              <a:ext uri="{FF2B5EF4-FFF2-40B4-BE49-F238E27FC236}">
-                <a16:creationId xmlns:a16="http://schemas.microsoft.com/office/drawing/2014/main" id="{5B21ECCD-9823-405F-AA9A-D0CC235AD583}"/>
-              </a:ext>
-            </a:extLst>
-          </p:cNvPr>
-          <p:cNvSpPr>
-            <a:spLocks noGrp="1"/>
-          </p:cNvSpPr>
-          <p:nvPr>
-            <p:ph idx="1"/>
-          </p:nvPr>
-        </p:nvSpPr>
-        <p:spPr/>
-        <p:txBody>
-          <a:bodyPr/>
-          <a:lstStyle/>
-          <a:p>
-            <a:r>
-              <a:rPr lang="en-US" dirty="0"/>
-              <a:t>You should now be able to:</a:t>
-            </a:r>
-          </a:p>
-          <a:p>
-            <a:pPr lvl="1"/>
-            <a:r>
-              <a:rPr lang="en-US" dirty="0"/>
-              <a:t>Explain what is meant by "run-to-completion semantics"</a:t>
-            </a:r>
-          </a:p>
-          <a:p>
-            <a:pPr lvl="1"/>
-            <a:r>
-              <a:rPr lang="en-US" dirty="0"/>
-              <a:t>Describe 3 ways in which event handlers may become ready for execution</a:t>
-            </a:r>
-          </a:p>
-          <a:p>
-            <a:pPr lvl="1"/>
-            <a:r>
-              <a:rPr lang="en-US" dirty="0"/>
-              <a:t>Explain what a "promise" is</a:t>
-            </a:r>
-          </a:p>
-          <a:p>
-            <a:pPr lvl="1"/>
-            <a:r>
-              <a:rPr lang="en-US" dirty="0"/>
-              <a:t>Given a program consisting of straight-line promises like the ones in the examples, predict the order in which the different pieces can execute.</a:t>
-            </a:r>
-          </a:p>
-          <a:p>
-            <a:pPr lvl="1"/>
-            <a:endParaRPr lang="en-US" dirty="0"/>
-          </a:p>
-          <a:p>
-            <a:pPr lvl="2"/>
-            <a:endParaRPr lang="en-US" dirty="0"/>
-          </a:p>
-          <a:p>
-            <a:pPr lvl="1"/>
-            <a:endParaRPr lang="en-US" dirty="0"/>
-          </a:p>
-        </p:txBody>
-      </p:sp>
-      <p:sp>
-        <p:nvSpPr>
-          <p:cNvPr id="5" name="Slide Number Placeholder 4">
-            <a:extLst>
-              <a:ext uri="{FF2B5EF4-FFF2-40B4-BE49-F238E27FC236}">
-                <a16:creationId xmlns:a16="http://schemas.microsoft.com/office/drawing/2014/main" id="{D3CB1048-3EB8-4281-8361-E7EB70F6FBBC}"/>
-              </a:ext>
-            </a:extLst>
-          </p:cNvPr>
-          <p:cNvSpPr>
-            <a:spLocks noGrp="1"/>
-          </p:cNvSpPr>
-          <p:nvPr>
-            <p:ph type="sldNum" sz="quarter" idx="12"/>
-          </p:nvPr>
-        </p:nvSpPr>
-        <p:spPr/>
-        <p:txBody>
-          <a:bodyPr/>
-          <a:lstStyle/>
-          <a:p>
-            <a:fld id="{86CB4B4D-7CA3-9044-876B-883B54F8677D}" type="slidenum">
-              <a:rPr lang="en-US" smtClean="0"/>
-              <a:pPr/>
-              <a:t>19</a:t>
-            </a:fld>
-            <a:endParaRPr lang="en-US"/>
-          </a:p>
-        </p:txBody>
-      </p:sp>
-    </p:spTree>
-    <p:extLst>
-      <p:ext uri="{BB962C8B-B14F-4D97-AF65-F5344CB8AC3E}">
-        <p14:creationId xmlns:p14="http://schemas.microsoft.com/office/powerpoint/2010/main" val="1362954822"/>
-      </p:ext>
-    </p:extLst>
-  </p:cSld>
-  <p:clrMapOvr>
-    <a:masterClrMapping/>
-  </p:clrMapOvr>
-</p:sld>
-</file>
-
 <file path=ppt/slides/slide2.xml><?xml version="1.0" encoding="utf-8"?>
 <p:sld xmlns:a="http://schemas.openxmlformats.org/drawingml/2006/main" xmlns:r="http://schemas.openxmlformats.org/officeDocument/2006/relationships" xmlns:p="http://schemas.openxmlformats.org/presentationml/2006/main">
   <p:cSld>
@@ -11862,7 +12642,7 @@
           <p:cNvPr id="2" name="Title 1">
             <a:extLst>
               <a:ext uri="{FF2B5EF4-FFF2-40B4-BE49-F238E27FC236}">
-                <a16:creationId xmlns:a16="http://schemas.microsoft.com/office/drawing/2014/main" id="{7EB782C9-1CF8-40AE-A725-0968E5F17117}"/>
+                <a16:creationId xmlns:a16="http://schemas.microsoft.com/office/drawing/2014/main" id="{B6D33575-0593-49FD-831F-131BB6CC7E6C}"/>
               </a:ext>
             </a:extLst>
           </p:cNvPr>
@@ -11880,17 +12660,17 @@
           <a:p>
             <a:r>
               <a:rPr lang="en-US" dirty="0"/>
-              <a:t>Next steps...</a:t>
+              <a:t>Review: Learning Objectives for this Lesson</a:t>
             </a:r>
           </a:p>
         </p:txBody>
       </p:sp>
       <p:sp>
         <p:nvSpPr>
-          <p:cNvPr id="4" name="Text Placeholder 3">
-            <a:extLst>
-              <a:ext uri="{FF2B5EF4-FFF2-40B4-BE49-F238E27FC236}">
-                <a16:creationId xmlns:a16="http://schemas.microsoft.com/office/drawing/2014/main" id="{219D61F8-F8AD-4DBB-8160-3A2A2DFCA287}"/>
+          <p:cNvPr id="3" name="Text Placeholder 2">
+            <a:extLst>
+              <a:ext uri="{FF2B5EF4-FFF2-40B4-BE49-F238E27FC236}">
+                <a16:creationId xmlns:a16="http://schemas.microsoft.com/office/drawing/2014/main" id="{5B21ECCD-9823-405F-AA9A-D0CC235AD583}"/>
               </a:ext>
             </a:extLst>
           </p:cNvPr>
@@ -11906,19 +12686,59 @@
           <a:bodyPr/>
           <a:lstStyle/>
           <a:p>
+            <a:r>
+              <a:rPr lang="en-US" dirty="0"/>
+              <a:t>You should now be able to:</a:t>
+            </a:r>
+          </a:p>
+          <a:p>
+            <a:pPr lvl="1"/>
+            <a:r>
+              <a:rPr lang="en-US" dirty="0"/>
+              <a:t>Explain what is meant by "run-to-completion semantics"</a:t>
+            </a:r>
+          </a:p>
+          <a:p>
+            <a:pPr lvl="1"/>
+            <a:r>
+              <a:rPr lang="en-US" dirty="0"/>
+              <a:t>Describe 3 ways in which event handlers may become ready for execution</a:t>
+            </a:r>
+          </a:p>
+          <a:p>
+            <a:pPr lvl="1"/>
+            <a:r>
+              <a:rPr lang="en-US" dirty="0"/>
+              <a:t>Explain what a "promise" is</a:t>
+            </a:r>
+          </a:p>
+          <a:p>
+            <a:pPr lvl="1"/>
+            <a:r>
+              <a:rPr lang="en-US" dirty="0"/>
+              <a:t>Given a program consisting of straight-line promises like the ones in the examples, predict the order in which the different pieces can execute.</a:t>
+            </a:r>
+          </a:p>
+          <a:p>
+            <a:pPr lvl="1"/>
             <a:endParaRPr lang="en-US" dirty="0"/>
           </a:p>
           <a:p>
+            <a:pPr lvl="2"/>
+            <a:endParaRPr lang="en-US" dirty="0"/>
+          </a:p>
+          <a:p>
+            <a:pPr lvl="1"/>
             <a:endParaRPr lang="en-US" dirty="0"/>
           </a:p>
         </p:txBody>
       </p:sp>
       <p:sp>
         <p:nvSpPr>
-          <p:cNvPr id="3" name="Slide Number Placeholder 2">
-            <a:extLst>
-              <a:ext uri="{FF2B5EF4-FFF2-40B4-BE49-F238E27FC236}">
-                <a16:creationId xmlns:a16="http://schemas.microsoft.com/office/drawing/2014/main" id="{E8071048-C09E-4AA0-A373-2A42FFDB91FE}"/>
+          <p:cNvPr id="5" name="Slide Number Placeholder 4">
+            <a:extLst>
+              <a:ext uri="{FF2B5EF4-FFF2-40B4-BE49-F238E27FC236}">
+                <a16:creationId xmlns:a16="http://schemas.microsoft.com/office/drawing/2014/main" id="{D3CB1048-3EB8-4281-8361-E7EB70F6FBBC}"/>
               </a:ext>
             </a:extLst>
           </p:cNvPr>
@@ -11938,6 +12758,122 @@
               <a:rPr lang="en-US" smtClean="0"/>
               <a:pPr/>
               <a:t>20</a:t>
+            </a:fld>
+            <a:endParaRPr lang="en-US"/>
+          </a:p>
+        </p:txBody>
+      </p:sp>
+    </p:spTree>
+    <p:extLst>
+      <p:ext uri="{BB962C8B-B14F-4D97-AF65-F5344CB8AC3E}">
+        <p14:creationId xmlns:p14="http://schemas.microsoft.com/office/powerpoint/2010/main" val="1362954822"/>
+      </p:ext>
+    </p:extLst>
+  </p:cSld>
+  <p:clrMapOvr>
+    <a:masterClrMapping/>
+  </p:clrMapOvr>
+</p:sld>
+</file>
+
+<file path=ppt/slides/slide21.xml><?xml version="1.0" encoding="utf-8"?>
+<p:sld xmlns:a="http://schemas.openxmlformats.org/drawingml/2006/main" xmlns:r="http://schemas.openxmlformats.org/officeDocument/2006/relationships" xmlns:p="http://schemas.openxmlformats.org/presentationml/2006/main">
+  <p:cSld>
+    <p:spTree>
+      <p:nvGrpSpPr>
+        <p:cNvPr id="1" name=""/>
+        <p:cNvGrpSpPr/>
+        <p:nvPr/>
+      </p:nvGrpSpPr>
+      <p:grpSpPr>
+        <a:xfrm>
+          <a:off x="0" y="0"/>
+          <a:ext cx="0" cy="0"/>
+          <a:chOff x="0" y="0"/>
+          <a:chExt cx="0" cy="0"/>
+        </a:xfrm>
+      </p:grpSpPr>
+      <p:sp>
+        <p:nvSpPr>
+          <p:cNvPr id="2" name="Title 1">
+            <a:extLst>
+              <a:ext uri="{FF2B5EF4-FFF2-40B4-BE49-F238E27FC236}">
+                <a16:creationId xmlns:a16="http://schemas.microsoft.com/office/drawing/2014/main" id="{7EB782C9-1CF8-40AE-A725-0968E5F17117}"/>
+              </a:ext>
+            </a:extLst>
+          </p:cNvPr>
+          <p:cNvSpPr>
+            <a:spLocks noGrp="1"/>
+          </p:cNvSpPr>
+          <p:nvPr>
+            <p:ph type="title"/>
+          </p:nvPr>
+        </p:nvSpPr>
+        <p:spPr/>
+        <p:txBody>
+          <a:bodyPr/>
+          <a:lstStyle/>
+          <a:p>
+            <a:r>
+              <a:rPr lang="en-US" dirty="0"/>
+              <a:t>Next steps...</a:t>
+            </a:r>
+          </a:p>
+        </p:txBody>
+      </p:sp>
+      <p:sp>
+        <p:nvSpPr>
+          <p:cNvPr id="4" name="Text Placeholder 3">
+            <a:extLst>
+              <a:ext uri="{FF2B5EF4-FFF2-40B4-BE49-F238E27FC236}">
+                <a16:creationId xmlns:a16="http://schemas.microsoft.com/office/drawing/2014/main" id="{219D61F8-F8AD-4DBB-8160-3A2A2DFCA287}"/>
+              </a:ext>
+            </a:extLst>
+          </p:cNvPr>
+          <p:cNvSpPr>
+            <a:spLocks noGrp="1"/>
+          </p:cNvSpPr>
+          <p:nvPr>
+            <p:ph idx="1"/>
+          </p:nvPr>
+        </p:nvSpPr>
+        <p:spPr/>
+        <p:txBody>
+          <a:bodyPr/>
+          <a:lstStyle/>
+          <a:p>
+            <a:endParaRPr lang="en-US" dirty="0"/>
+          </a:p>
+          <a:p>
+            <a:endParaRPr lang="en-US" dirty="0"/>
+          </a:p>
+        </p:txBody>
+      </p:sp>
+      <p:sp>
+        <p:nvSpPr>
+          <p:cNvPr id="3" name="Slide Number Placeholder 2">
+            <a:extLst>
+              <a:ext uri="{FF2B5EF4-FFF2-40B4-BE49-F238E27FC236}">
+                <a16:creationId xmlns:a16="http://schemas.microsoft.com/office/drawing/2014/main" id="{E8071048-C09E-4AA0-A373-2A42FFDB91FE}"/>
+              </a:ext>
+            </a:extLst>
+          </p:cNvPr>
+          <p:cNvSpPr>
+            <a:spLocks noGrp="1"/>
+          </p:cNvSpPr>
+          <p:nvPr>
+            <p:ph type="sldNum" sz="quarter" idx="12"/>
+          </p:nvPr>
+        </p:nvSpPr>
+        <p:spPr/>
+        <p:txBody>
+          <a:bodyPr/>
+          <a:lstStyle/>
+          <a:p>
+            <a:fld id="{86CB4B4D-7CA3-9044-876B-883B54F8677D}" type="slidenum">
+              <a:rPr lang="en-US" smtClean="0"/>
+              <a:pPr/>
+              <a:t>21</a:t>
             </a:fld>
             <a:endParaRPr lang="en-US"/>
           </a:p>
@@ -12137,6 +13073,12 @@
           <a:p>
             <a:r>
               <a:rPr lang="en-US" dirty="0"/>
+              <a:t>Be prepared to explain each line in the output examples</a:t>
+            </a:r>
+          </a:p>
+          <a:p>
+            <a:r>
+              <a:rPr lang="en-US" dirty="0"/>
               <a:t>Create some examples like the ones here and try to predict what they will do.</a:t>
             </a:r>
           </a:p>
@@ -12169,7 +13111,7 @@
 </p:sld>
 </file>
 
-<file path=ppt/slides/slide21.xml><?xml version="1.0" encoding="utf-8"?>
+<file path=ppt/slides/slide22.xml><?xml version="1.0" encoding="utf-8"?>
 <p:sld xmlns:a="http://schemas.openxmlformats.org/drawingml/2006/main" xmlns:r="http://schemas.openxmlformats.org/officeDocument/2006/relationships" xmlns:p="http://schemas.openxmlformats.org/presentationml/2006/main" show="0">
   <p:cSld>
     <p:spTree>
@@ -12234,7 +13176,7 @@
           <a:p>
             <a:fld id="{20F37917-FD3A-4669-9018-DA04BCDD3D75}" type="slidenum">
               <a:rPr lang="en-US" smtClean="0"/>
-              <a:t>21</a:t>
+              <a:t>22</a:t>
             </a:fld>
             <a:endParaRPr lang="en-US"/>
           </a:p>
@@ -13717,6 +14659,70 @@
           </a:p>
         </p:txBody>
       </p:sp>
+      <p:sp>
+        <p:nvSpPr>
+          <p:cNvPr id="5" name="Rectangle 4">
+            <a:extLst>
+              <a:ext uri="{FF2B5EF4-FFF2-40B4-BE49-F238E27FC236}">
+                <a16:creationId xmlns:a16="http://schemas.microsoft.com/office/drawing/2014/main" id="{B23D8312-117A-4904-9FD8-05057B3AA65A}"/>
+              </a:ext>
+            </a:extLst>
+          </p:cNvPr>
+          <p:cNvSpPr/>
+          <p:nvPr/>
+        </p:nvSpPr>
+        <p:spPr>
+          <a:xfrm>
+            <a:off x="8725546" y="2103436"/>
+            <a:ext cx="3365137" cy="2088736"/>
+          </a:xfrm>
+          <a:prstGeom prst="rect">
+            <a:avLst/>
+          </a:prstGeom>
+          <a:solidFill>
+            <a:schemeClr val="accent2">
+              <a:lumMod val="20000"/>
+              <a:lumOff val="80000"/>
+            </a:schemeClr>
+          </a:solidFill>
+          <a:ln>
+            <a:solidFill>
+              <a:srgbClr val="0070C0"/>
+            </a:solidFill>
+          </a:ln>
+        </p:spPr>
+        <p:style>
+          <a:lnRef idx="2">
+            <a:schemeClr val="accent1">
+              <a:shade val="50000"/>
+            </a:schemeClr>
+          </a:lnRef>
+          <a:fillRef idx="1">
+            <a:schemeClr val="accent1"/>
+          </a:fillRef>
+          <a:effectRef idx="0">
+            <a:schemeClr val="accent1"/>
+          </a:effectRef>
+          <a:fontRef idx="minor">
+            <a:schemeClr val="lt1"/>
+          </a:fontRef>
+        </p:style>
+        <p:txBody>
+          <a:bodyPr rtlCol="0" anchor="t"/>
+          <a:lstStyle/>
+          <a:p>
+            <a:r>
+              <a:rPr lang="en-US" b="1" dirty="0">
+                <a:solidFill>
+                  <a:schemeClr val="tx1"/>
+                </a:solidFill>
+                <a:latin typeface="Ink Free" panose="03080402000500000000" pitchFamily="66" charset="0"/>
+              </a:rPr>
+              <a:t>People use different names for these things.  Some call them "callbacks"; others call them "messages"; others might call them "green threads".  "Event handlers" seems like the best name for now.</a:t>
+            </a:r>
+          </a:p>
+        </p:txBody>
+      </p:sp>
     </p:spTree>
     <p:extLst>
       <p:ext uri="{BB962C8B-B14F-4D97-AF65-F5344CB8AC3E}">
@@ -13727,6 +14733,84 @@
   <p:clrMapOvr>
     <a:masterClrMapping/>
   </p:clrMapOvr>
+  <p:timing>
+    <p:tnLst>
+      <p:par>
+        <p:cTn id="1" dur="indefinite" restart="never" nodeType="tmRoot">
+          <p:childTnLst>
+            <p:seq concurrent="1" nextAc="seek">
+              <p:cTn id="2" dur="indefinite" nodeType="mainSeq">
+                <p:childTnLst>
+                  <p:par>
+                    <p:cTn id="3" fill="hold">
+                      <p:stCondLst>
+                        <p:cond delay="indefinite"/>
+                      </p:stCondLst>
+                      <p:childTnLst>
+                        <p:par>
+                          <p:cTn id="4" fill="hold">
+                            <p:stCondLst>
+                              <p:cond delay="0"/>
+                            </p:stCondLst>
+                            <p:childTnLst>
+                              <p:par>
+                                <p:cTn id="5" presetID="1" presetClass="entr" presetSubtype="0" fill="hold" grpId="0" nodeType="clickEffect">
+                                  <p:stCondLst>
+                                    <p:cond delay="0"/>
+                                  </p:stCondLst>
+                                  <p:childTnLst>
+                                    <p:set>
+                                      <p:cBhvr>
+                                        <p:cTn id="6" dur="1" fill="hold">
+                                          <p:stCondLst>
+                                            <p:cond delay="9"/>
+                                          </p:stCondLst>
+                                        </p:cTn>
+                                        <p:tgtEl>
+                                          <p:spTgt spid="5"/>
+                                        </p:tgtEl>
+                                        <p:attrNameLst>
+                                          <p:attrName>style.visibility</p:attrName>
+                                        </p:attrNameLst>
+                                      </p:cBhvr>
+                                      <p:to>
+                                        <p:strVal val="visible"/>
+                                      </p:to>
+                                    </p:set>
+                                  </p:childTnLst>
+                                </p:cTn>
+                              </p:par>
+                            </p:childTnLst>
+                          </p:cTn>
+                        </p:par>
+                      </p:childTnLst>
+                    </p:cTn>
+                  </p:par>
+                </p:childTnLst>
+              </p:cTn>
+              <p:prevCondLst>
+                <p:cond evt="onPrev" delay="0">
+                  <p:tgtEl>
+                    <p:sldTgt/>
+                  </p:tgtEl>
+                </p:cond>
+              </p:prevCondLst>
+              <p:nextCondLst>
+                <p:cond evt="onNext" delay="0">
+                  <p:tgtEl>
+                    <p:sldTgt/>
+                  </p:tgtEl>
+                </p:cond>
+              </p:nextCondLst>
+            </p:seq>
+          </p:childTnLst>
+        </p:cTn>
+      </p:par>
+    </p:tnLst>
+    <p:bldLst>
+      <p:bldP spid="5" grpId="0" animBg="1"/>
+    </p:bldLst>
+  </p:timing>
 </p:sld>
 </file>
 
@@ -13818,7 +14902,7 @@
           <a:p>
             <a:r>
               <a:rPr lang="en-US" dirty="0"/>
-              <a:t>This one is not ready: its event hasn't happened yet.</a:t>
+              <a:t>This one is not ready: it's still waiting for its event to happen.</a:t>
             </a:r>
           </a:p>
         </p:txBody>
@@ -14245,6 +15329,158 @@
   <p:clrMapOvr>
     <a:masterClrMapping/>
   </p:clrMapOvr>
+  <p:timing>
+    <p:tnLst>
+      <p:par>
+        <p:cTn id="1" dur="indefinite" restart="never" nodeType="tmRoot">
+          <p:childTnLst>
+            <p:seq concurrent="1" nextAc="seek">
+              <p:cTn id="2" dur="indefinite" nodeType="mainSeq">
+                <p:childTnLst>
+                  <p:par>
+                    <p:cTn id="3" fill="hold">
+                      <p:stCondLst>
+                        <p:cond delay="indefinite"/>
+                      </p:stCondLst>
+                      <p:childTnLst>
+                        <p:par>
+                          <p:cTn id="4" fill="hold">
+                            <p:stCondLst>
+                              <p:cond delay="0"/>
+                            </p:stCondLst>
+                            <p:childTnLst>
+                              <p:par>
+                                <p:cTn id="5" presetID="1" presetClass="entr" presetSubtype="0" fill="hold" grpId="0" nodeType="clickEffect">
+                                  <p:stCondLst>
+                                    <p:cond delay="0"/>
+                                  </p:stCondLst>
+                                  <p:childTnLst>
+                                    <p:set>
+                                      <p:cBhvr>
+                                        <p:cTn id="6" dur="1" fill="hold">
+                                          <p:stCondLst>
+                                            <p:cond delay="0"/>
+                                          </p:stCondLst>
+                                        </p:cTn>
+                                        <p:tgtEl>
+                                          <p:spTgt spid="6"/>
+                                        </p:tgtEl>
+                                        <p:attrNameLst>
+                                          <p:attrName>style.visibility</p:attrName>
+                                        </p:attrNameLst>
+                                      </p:cBhvr>
+                                      <p:to>
+                                        <p:strVal val="visible"/>
+                                      </p:to>
+                                    </p:set>
+                                  </p:childTnLst>
+                                </p:cTn>
+                              </p:par>
+                            </p:childTnLst>
+                          </p:cTn>
+                        </p:par>
+                      </p:childTnLst>
+                    </p:cTn>
+                  </p:par>
+                  <p:par>
+                    <p:cTn id="7" fill="hold">
+                      <p:stCondLst>
+                        <p:cond delay="indefinite"/>
+                      </p:stCondLst>
+                      <p:childTnLst>
+                        <p:par>
+                          <p:cTn id="8" fill="hold">
+                            <p:stCondLst>
+                              <p:cond delay="0"/>
+                            </p:stCondLst>
+                            <p:childTnLst>
+                              <p:par>
+                                <p:cTn id="9" presetID="1" presetClass="exit" presetSubtype="0" fill="hold" grpId="1" nodeType="clickEffect">
+                                  <p:stCondLst>
+                                    <p:cond delay="0"/>
+                                  </p:stCondLst>
+                                  <p:childTnLst>
+                                    <p:set>
+                                      <p:cBhvr>
+                                        <p:cTn id="10" dur="1" fill="hold">
+                                          <p:stCondLst>
+                                            <p:cond delay="0"/>
+                                          </p:stCondLst>
+                                        </p:cTn>
+                                        <p:tgtEl>
+                                          <p:spTgt spid="6"/>
+                                        </p:tgtEl>
+                                        <p:attrNameLst>
+                                          <p:attrName>style.visibility</p:attrName>
+                                        </p:attrNameLst>
+                                      </p:cBhvr>
+                                      <p:to>
+                                        <p:strVal val="hidden"/>
+                                      </p:to>
+                                    </p:set>
+                                  </p:childTnLst>
+                                </p:cTn>
+                              </p:par>
+                              <p:par>
+                                <p:cTn id="11" presetID="1" presetClass="entr" presetSubtype="0" fill="hold" grpId="0" nodeType="withEffect">
+                                  <p:stCondLst>
+                                    <p:cond delay="0"/>
+                                  </p:stCondLst>
+                                  <p:childTnLst>
+                                    <p:set>
+                                      <p:cBhvr>
+                                        <p:cTn id="12" dur="1" fill="hold">
+                                          <p:stCondLst>
+                                            <p:cond delay="0"/>
+                                          </p:stCondLst>
+                                        </p:cTn>
+                                        <p:tgtEl>
+                                          <p:spTgt spid="7"/>
+                                        </p:tgtEl>
+                                        <p:attrNameLst>
+                                          <p:attrName>style.visibility</p:attrName>
+                                        </p:attrNameLst>
+                                      </p:cBhvr>
+                                      <p:to>
+                                        <p:strVal val="visible"/>
+                                      </p:to>
+                                    </p:set>
+                                  </p:childTnLst>
+                                </p:cTn>
+                              </p:par>
+                            </p:childTnLst>
+                          </p:cTn>
+                        </p:par>
+                      </p:childTnLst>
+                    </p:cTn>
+                  </p:par>
+                </p:childTnLst>
+              </p:cTn>
+              <p:prevCondLst>
+                <p:cond evt="onPrev" delay="0">
+                  <p:tgtEl>
+                    <p:sldTgt/>
+                  </p:tgtEl>
+                </p:cond>
+              </p:prevCondLst>
+              <p:nextCondLst>
+                <p:cond evt="onNext" delay="0">
+                  <p:tgtEl>
+                    <p:sldTgt/>
+                  </p:tgtEl>
+                </p:cond>
+              </p:nextCondLst>
+            </p:seq>
+          </p:childTnLst>
+        </p:cTn>
+      </p:par>
+    </p:tnLst>
+    <p:bldLst>
+      <p:bldP spid="6" grpId="0" animBg="1"/>
+      <p:bldP spid="6" grpId="1" animBg="1"/>
+      <p:bldP spid="7" grpId="0" animBg="1"/>
+    </p:bldLst>
+  </p:timing>
 </p:sld>
 </file>
 
@@ -14682,10 +15918,386 @@
       </p:grpSp>
       <p:grpSp>
         <p:nvGrpSpPr>
-          <p:cNvPr id="3" name="Group 2">
-            <a:extLst>
-              <a:ext uri="{FF2B5EF4-FFF2-40B4-BE49-F238E27FC236}">
-                <a16:creationId xmlns:a16="http://schemas.microsoft.com/office/drawing/2014/main" id="{EBACE086-2315-4BE9-8CB0-0DD9D662FCE9}"/>
+          <p:cNvPr id="9" name="Group 8">
+            <a:extLst>
+              <a:ext uri="{FF2B5EF4-FFF2-40B4-BE49-F238E27FC236}">
+                <a16:creationId xmlns:a16="http://schemas.microsoft.com/office/drawing/2014/main" id="{1E80647D-D6EB-4072-AB8B-C4B501BB8AEB}"/>
+              </a:ext>
+            </a:extLst>
+          </p:cNvPr>
+          <p:cNvGrpSpPr/>
+          <p:nvPr/>
+        </p:nvGrpSpPr>
+        <p:grpSpPr>
+          <a:xfrm>
+            <a:off x="6724426" y="2816470"/>
+            <a:ext cx="492369" cy="2286000"/>
+            <a:chOff x="9425354" y="2349305"/>
+            <a:chExt cx="492369" cy="2286000"/>
+          </a:xfrm>
+          <a:solidFill>
+            <a:srgbClr val="00B050"/>
+          </a:solidFill>
+        </p:grpSpPr>
+        <p:cxnSp>
+          <p:nvCxnSpPr>
+            <p:cNvPr id="10" name="Straight Connector 9">
+              <a:extLst>
+                <a:ext uri="{FF2B5EF4-FFF2-40B4-BE49-F238E27FC236}">
+                  <a16:creationId xmlns:a16="http://schemas.microsoft.com/office/drawing/2014/main" id="{62BBEA76-81FF-40A6-B586-3742C6AE173C}"/>
+                </a:ext>
+              </a:extLst>
+            </p:cNvPr>
+            <p:cNvCxnSpPr>
+              <a:cxnSpLocks/>
+              <a:stCxn id="11" idx="4"/>
+            </p:cNvCxnSpPr>
+            <p:nvPr/>
+          </p:nvCxnSpPr>
+          <p:spPr>
+            <a:xfrm flipH="1">
+              <a:off x="9664505" y="2841674"/>
+              <a:ext cx="7034" cy="1793631"/>
+            </a:xfrm>
+            <a:prstGeom prst="line">
+              <a:avLst/>
+            </a:prstGeom>
+            <a:grpFill/>
+            <a:ln w="44450">
+              <a:solidFill>
+                <a:schemeClr val="tx1"/>
+              </a:solidFill>
+              <a:tailEnd type="none" w="lg" len="lg"/>
+            </a:ln>
+          </p:spPr>
+          <p:style>
+            <a:lnRef idx="1">
+              <a:schemeClr val="accent1"/>
+            </a:lnRef>
+            <a:fillRef idx="0">
+              <a:schemeClr val="accent1"/>
+            </a:fillRef>
+            <a:effectRef idx="0">
+              <a:schemeClr val="accent1"/>
+            </a:effectRef>
+            <a:fontRef idx="minor">
+              <a:schemeClr val="tx1"/>
+            </a:fontRef>
+          </p:style>
+        </p:cxnSp>
+        <p:sp>
+          <p:nvSpPr>
+            <p:cNvPr id="11" name="Oval 10">
+              <a:extLst>
+                <a:ext uri="{FF2B5EF4-FFF2-40B4-BE49-F238E27FC236}">
+                  <a16:creationId xmlns:a16="http://schemas.microsoft.com/office/drawing/2014/main" id="{8E283931-4022-4370-B4D7-872BF5D9EFAD}"/>
+                </a:ext>
+              </a:extLst>
+            </p:cNvPr>
+            <p:cNvSpPr/>
+            <p:nvPr/>
+          </p:nvSpPr>
+          <p:spPr>
+            <a:xfrm>
+              <a:off x="9425354" y="2349305"/>
+              <a:ext cx="492369" cy="492369"/>
+            </a:xfrm>
+            <a:prstGeom prst="ellipse">
+              <a:avLst/>
+            </a:prstGeom>
+            <a:grpFill/>
+            <a:ln w="44450">
+              <a:solidFill>
+                <a:schemeClr val="tx1"/>
+              </a:solidFill>
+            </a:ln>
+          </p:spPr>
+          <p:style>
+            <a:lnRef idx="2">
+              <a:schemeClr val="accent1">
+                <a:shade val="50000"/>
+              </a:schemeClr>
+            </a:lnRef>
+            <a:fillRef idx="1">
+              <a:schemeClr val="accent1"/>
+            </a:fillRef>
+            <a:effectRef idx="0">
+              <a:schemeClr val="accent1"/>
+            </a:effectRef>
+            <a:fontRef idx="minor">
+              <a:schemeClr val="lt1"/>
+            </a:fontRef>
+          </p:style>
+          <p:txBody>
+            <a:bodyPr rtlCol="0" anchor="ctr"/>
+            <a:lstStyle/>
+            <a:p>
+              <a:pPr algn="l"/>
+              <a:endParaRPr lang="en-US" dirty="0">
+                <a:solidFill>
+                  <a:schemeClr val="tx1"/>
+                </a:solidFill>
+              </a:endParaRPr>
+            </a:p>
+          </p:txBody>
+        </p:sp>
+      </p:grpSp>
+      <p:grpSp>
+        <p:nvGrpSpPr>
+          <p:cNvPr id="12" name="Group 11">
+            <a:extLst>
+              <a:ext uri="{FF2B5EF4-FFF2-40B4-BE49-F238E27FC236}">
+                <a16:creationId xmlns:a16="http://schemas.microsoft.com/office/drawing/2014/main" id="{641AB54C-93E1-41E2-B149-5CC7683BF4D5}"/>
+              </a:ext>
+            </a:extLst>
+          </p:cNvPr>
+          <p:cNvGrpSpPr/>
+          <p:nvPr/>
+        </p:nvGrpSpPr>
+        <p:grpSpPr>
+          <a:xfrm>
+            <a:off x="8944922" y="2816470"/>
+            <a:ext cx="492369" cy="2286000"/>
+            <a:chOff x="9425354" y="2349305"/>
+            <a:chExt cx="492369" cy="2286000"/>
+          </a:xfrm>
+          <a:solidFill>
+            <a:srgbClr val="FF0000"/>
+          </a:solidFill>
+        </p:grpSpPr>
+        <p:sp>
+          <p:nvSpPr>
+            <p:cNvPr id="13" name="Oval 12">
+              <a:extLst>
+                <a:ext uri="{FF2B5EF4-FFF2-40B4-BE49-F238E27FC236}">
+                  <a16:creationId xmlns:a16="http://schemas.microsoft.com/office/drawing/2014/main" id="{D6C207F3-73A5-417B-BD96-BD1017859CD3}"/>
+                </a:ext>
+              </a:extLst>
+            </p:cNvPr>
+            <p:cNvSpPr/>
+            <p:nvPr/>
+          </p:nvSpPr>
+          <p:spPr>
+            <a:xfrm>
+              <a:off x="9425354" y="2349305"/>
+              <a:ext cx="492369" cy="492369"/>
+            </a:xfrm>
+            <a:prstGeom prst="ellipse">
+              <a:avLst/>
+            </a:prstGeom>
+            <a:grpFill/>
+            <a:ln w="44450">
+              <a:solidFill>
+                <a:schemeClr val="tx1"/>
+              </a:solidFill>
+            </a:ln>
+          </p:spPr>
+          <p:style>
+            <a:lnRef idx="2">
+              <a:schemeClr val="accent1">
+                <a:shade val="50000"/>
+              </a:schemeClr>
+            </a:lnRef>
+            <a:fillRef idx="1">
+              <a:schemeClr val="accent1"/>
+            </a:fillRef>
+            <a:effectRef idx="0">
+              <a:schemeClr val="accent1"/>
+            </a:effectRef>
+            <a:fontRef idx="minor">
+              <a:schemeClr val="lt1"/>
+            </a:fontRef>
+          </p:style>
+          <p:txBody>
+            <a:bodyPr rtlCol="0" anchor="ctr"/>
+            <a:lstStyle/>
+            <a:p>
+              <a:pPr algn="l"/>
+              <a:endParaRPr lang="en-US" dirty="0">
+                <a:solidFill>
+                  <a:schemeClr val="tx1"/>
+                </a:solidFill>
+              </a:endParaRPr>
+            </a:p>
+          </p:txBody>
+        </p:sp>
+        <p:cxnSp>
+          <p:nvCxnSpPr>
+            <p:cNvPr id="14" name="Straight Connector 13">
+              <a:extLst>
+                <a:ext uri="{FF2B5EF4-FFF2-40B4-BE49-F238E27FC236}">
+                  <a16:creationId xmlns:a16="http://schemas.microsoft.com/office/drawing/2014/main" id="{317B3973-2B49-4F12-9426-57D2604A26E0}"/>
+                </a:ext>
+              </a:extLst>
+            </p:cNvPr>
+            <p:cNvCxnSpPr>
+              <a:stCxn id="13" idx="4"/>
+            </p:cNvCxnSpPr>
+            <p:nvPr/>
+          </p:nvCxnSpPr>
+          <p:spPr>
+            <a:xfrm flipH="1">
+              <a:off x="9664505" y="2841674"/>
+              <a:ext cx="7034" cy="1793631"/>
+            </a:xfrm>
+            <a:prstGeom prst="line">
+              <a:avLst/>
+            </a:prstGeom>
+            <a:grpFill/>
+            <a:ln w="44450">
+              <a:solidFill>
+                <a:schemeClr val="tx1"/>
+              </a:solidFill>
+              <a:tailEnd type="none" w="lg" len="lg"/>
+            </a:ln>
+          </p:spPr>
+          <p:style>
+            <a:lnRef idx="1">
+              <a:schemeClr val="accent1"/>
+            </a:lnRef>
+            <a:fillRef idx="0">
+              <a:schemeClr val="accent1"/>
+            </a:fillRef>
+            <a:effectRef idx="0">
+              <a:schemeClr val="accent1"/>
+            </a:effectRef>
+            <a:fontRef idx="minor">
+              <a:schemeClr val="tx1"/>
+            </a:fontRef>
+          </p:style>
+        </p:cxnSp>
+      </p:grpSp>
+      <p:grpSp>
+        <p:nvGrpSpPr>
+          <p:cNvPr id="15" name="Group 14">
+            <a:extLst>
+              <a:ext uri="{FF2B5EF4-FFF2-40B4-BE49-F238E27FC236}">
+                <a16:creationId xmlns:a16="http://schemas.microsoft.com/office/drawing/2014/main" id="{D3FE9661-2174-4380-AD29-91E23FEDE506}"/>
+              </a:ext>
+            </a:extLst>
+          </p:cNvPr>
+          <p:cNvGrpSpPr/>
+          <p:nvPr/>
+        </p:nvGrpSpPr>
+        <p:grpSpPr>
+          <a:xfrm>
+            <a:off x="10055169" y="2816470"/>
+            <a:ext cx="492369" cy="2286000"/>
+            <a:chOff x="9425354" y="2349305"/>
+            <a:chExt cx="492369" cy="2286000"/>
+          </a:xfrm>
+          <a:solidFill>
+            <a:srgbClr val="FF0000"/>
+          </a:solidFill>
+        </p:grpSpPr>
+        <p:sp>
+          <p:nvSpPr>
+            <p:cNvPr id="16" name="Oval 15">
+              <a:extLst>
+                <a:ext uri="{FF2B5EF4-FFF2-40B4-BE49-F238E27FC236}">
+                  <a16:creationId xmlns:a16="http://schemas.microsoft.com/office/drawing/2014/main" id="{61C4B407-DBC9-4CD3-90C2-3B2B74152D19}"/>
+                </a:ext>
+              </a:extLst>
+            </p:cNvPr>
+            <p:cNvSpPr/>
+            <p:nvPr/>
+          </p:nvSpPr>
+          <p:spPr>
+            <a:xfrm>
+              <a:off x="9425354" y="2349305"/>
+              <a:ext cx="492369" cy="492369"/>
+            </a:xfrm>
+            <a:prstGeom prst="ellipse">
+              <a:avLst/>
+            </a:prstGeom>
+            <a:grpFill/>
+            <a:ln w="44450">
+              <a:solidFill>
+                <a:schemeClr val="tx1"/>
+              </a:solidFill>
+            </a:ln>
+          </p:spPr>
+          <p:style>
+            <a:lnRef idx="2">
+              <a:schemeClr val="accent1">
+                <a:shade val="50000"/>
+              </a:schemeClr>
+            </a:lnRef>
+            <a:fillRef idx="1">
+              <a:schemeClr val="accent1"/>
+            </a:fillRef>
+            <a:effectRef idx="0">
+              <a:schemeClr val="accent1"/>
+            </a:effectRef>
+            <a:fontRef idx="minor">
+              <a:schemeClr val="lt1"/>
+            </a:fontRef>
+          </p:style>
+          <p:txBody>
+            <a:bodyPr rtlCol="0" anchor="ctr"/>
+            <a:lstStyle/>
+            <a:p>
+              <a:pPr algn="l"/>
+              <a:endParaRPr lang="en-US" dirty="0">
+                <a:solidFill>
+                  <a:schemeClr val="tx1"/>
+                </a:solidFill>
+              </a:endParaRPr>
+            </a:p>
+          </p:txBody>
+        </p:sp>
+        <p:cxnSp>
+          <p:nvCxnSpPr>
+            <p:cNvPr id="17" name="Straight Connector 16">
+              <a:extLst>
+                <a:ext uri="{FF2B5EF4-FFF2-40B4-BE49-F238E27FC236}">
+                  <a16:creationId xmlns:a16="http://schemas.microsoft.com/office/drawing/2014/main" id="{39FC7061-B0FD-4532-B944-735DB2CE9051}"/>
+                </a:ext>
+              </a:extLst>
+            </p:cNvPr>
+            <p:cNvCxnSpPr>
+              <a:stCxn id="16" idx="4"/>
+            </p:cNvCxnSpPr>
+            <p:nvPr/>
+          </p:nvCxnSpPr>
+          <p:spPr>
+            <a:xfrm flipH="1">
+              <a:off x="9664505" y="2841674"/>
+              <a:ext cx="7034" cy="1793631"/>
+            </a:xfrm>
+            <a:prstGeom prst="line">
+              <a:avLst/>
+            </a:prstGeom>
+            <a:grpFill/>
+            <a:ln w="44450">
+              <a:solidFill>
+                <a:schemeClr val="tx1"/>
+              </a:solidFill>
+              <a:tailEnd type="none" w="lg" len="lg"/>
+            </a:ln>
+          </p:spPr>
+          <p:style>
+            <a:lnRef idx="1">
+              <a:schemeClr val="accent1"/>
+            </a:lnRef>
+            <a:fillRef idx="0">
+              <a:schemeClr val="accent1"/>
+            </a:fillRef>
+            <a:effectRef idx="0">
+              <a:schemeClr val="accent1"/>
+            </a:effectRef>
+            <a:fontRef idx="minor">
+              <a:schemeClr val="tx1"/>
+            </a:fontRef>
+          </p:style>
+        </p:cxnSp>
+      </p:grpSp>
+      <p:grpSp>
+        <p:nvGrpSpPr>
+          <p:cNvPr id="18" name="Group 17">
+            <a:extLst>
+              <a:ext uri="{FF2B5EF4-FFF2-40B4-BE49-F238E27FC236}">
+                <a16:creationId xmlns:a16="http://schemas.microsoft.com/office/drawing/2014/main" id="{E1CEA52E-9B61-434A-A9E7-7E5F8FB9AE93}"/>
               </a:ext>
             </a:extLst>
           </p:cNvPr>
@@ -14695,636 +16307,240 @@
         <p:grpSpPr>
           <a:xfrm>
             <a:off x="5614178" y="2816470"/>
-            <a:ext cx="4933360" cy="2286000"/>
-            <a:chOff x="5614178" y="2816470"/>
-            <a:chExt cx="4933360" cy="2286000"/>
+            <a:ext cx="492369" cy="2286000"/>
+            <a:chOff x="9425354" y="2349305"/>
+            <a:chExt cx="492369" cy="2286000"/>
           </a:xfrm>
+          <a:solidFill>
+            <a:srgbClr val="FF0000"/>
+          </a:solidFill>
         </p:grpSpPr>
-        <p:grpSp>
-          <p:nvGrpSpPr>
-            <p:cNvPr id="9" name="Group 8">
+        <p:sp>
+          <p:nvSpPr>
+            <p:cNvPr id="19" name="Oval 18">
               <a:extLst>
                 <a:ext uri="{FF2B5EF4-FFF2-40B4-BE49-F238E27FC236}">
-                  <a16:creationId xmlns:a16="http://schemas.microsoft.com/office/drawing/2014/main" id="{1E80647D-D6EB-4072-AB8B-C4B501BB8AEB}"/>
+                  <a16:creationId xmlns:a16="http://schemas.microsoft.com/office/drawing/2014/main" id="{229BBDF2-229F-477E-8347-C972FD66F67E}"/>
                 </a:ext>
               </a:extLst>
             </p:cNvPr>
-            <p:cNvGrpSpPr/>
+            <p:cNvSpPr/>
             <p:nvPr/>
-          </p:nvGrpSpPr>
-          <p:grpSpPr>
+          </p:nvSpPr>
+          <p:spPr>
             <a:xfrm>
-              <a:off x="6724426" y="2816470"/>
-              <a:ext cx="492369" cy="2286000"/>
-              <a:chOff x="9425354" y="2349305"/>
-              <a:chExt cx="492369" cy="2286000"/>
+              <a:off x="9425354" y="2349305"/>
+              <a:ext cx="492369" cy="492369"/>
             </a:xfrm>
-            <a:solidFill>
-              <a:srgbClr val="00B050"/>
-            </a:solidFill>
-          </p:grpSpPr>
-          <p:cxnSp>
-            <p:nvCxnSpPr>
-              <p:cNvPr id="10" name="Straight Connector 9">
-                <a:extLst>
-                  <a:ext uri="{FF2B5EF4-FFF2-40B4-BE49-F238E27FC236}">
-                    <a16:creationId xmlns:a16="http://schemas.microsoft.com/office/drawing/2014/main" id="{62BBEA76-81FF-40A6-B586-3742C6AE173C}"/>
-                  </a:ext>
-                </a:extLst>
-              </p:cNvPr>
-              <p:cNvCxnSpPr>
-                <a:stCxn id="11" idx="4"/>
-              </p:cNvCxnSpPr>
-              <p:nvPr/>
-            </p:nvCxnSpPr>
-            <p:spPr>
-              <a:xfrm flipH="1">
-                <a:off x="9664505" y="2841674"/>
-                <a:ext cx="7034" cy="1793631"/>
-              </a:xfrm>
-              <a:prstGeom prst="line">
-                <a:avLst/>
-              </a:prstGeom>
-              <a:grpFill/>
-              <a:ln w="44450">
+            <a:prstGeom prst="ellipse">
+              <a:avLst/>
+            </a:prstGeom>
+            <a:grpFill/>
+            <a:ln w="44450">
+              <a:solidFill>
+                <a:schemeClr val="tx1"/>
+              </a:solidFill>
+            </a:ln>
+          </p:spPr>
+          <p:style>
+            <a:lnRef idx="2">
+              <a:schemeClr val="accent1">
+                <a:shade val="50000"/>
+              </a:schemeClr>
+            </a:lnRef>
+            <a:fillRef idx="1">
+              <a:schemeClr val="accent1"/>
+            </a:fillRef>
+            <a:effectRef idx="0">
+              <a:schemeClr val="accent1"/>
+            </a:effectRef>
+            <a:fontRef idx="minor">
+              <a:schemeClr val="lt1"/>
+            </a:fontRef>
+          </p:style>
+          <p:txBody>
+            <a:bodyPr rtlCol="0" anchor="ctr"/>
+            <a:lstStyle/>
+            <a:p>
+              <a:pPr algn="l"/>
+              <a:endParaRPr lang="en-US" dirty="0">
                 <a:solidFill>
                   <a:schemeClr val="tx1"/>
                 </a:solidFill>
-                <a:tailEnd type="none" w="lg" len="lg"/>
-              </a:ln>
-            </p:spPr>
-            <p:style>
-              <a:lnRef idx="1">
-                <a:schemeClr val="accent1"/>
-              </a:lnRef>
-              <a:fillRef idx="0">
-                <a:schemeClr val="accent1"/>
-              </a:fillRef>
-              <a:effectRef idx="0">
-                <a:schemeClr val="accent1"/>
-              </a:effectRef>
-              <a:fontRef idx="minor">
-                <a:schemeClr val="tx1"/>
-              </a:fontRef>
-            </p:style>
-          </p:cxnSp>
-          <p:sp>
-            <p:nvSpPr>
-              <p:cNvPr id="11" name="Oval 10">
-                <a:extLst>
-                  <a:ext uri="{FF2B5EF4-FFF2-40B4-BE49-F238E27FC236}">
-                    <a16:creationId xmlns:a16="http://schemas.microsoft.com/office/drawing/2014/main" id="{8E283931-4022-4370-B4D7-872BF5D9EFAD}"/>
-                  </a:ext>
-                </a:extLst>
-              </p:cNvPr>
-              <p:cNvSpPr/>
-              <p:nvPr/>
-            </p:nvSpPr>
-            <p:spPr>
-              <a:xfrm>
-                <a:off x="9425354" y="2349305"/>
-                <a:ext cx="492369" cy="492369"/>
-              </a:xfrm>
-              <a:prstGeom prst="ellipse">
-                <a:avLst/>
-              </a:prstGeom>
-              <a:grpFill/>
-              <a:ln w="44450">
-                <a:solidFill>
-                  <a:schemeClr val="tx1"/>
-                </a:solidFill>
-              </a:ln>
-            </p:spPr>
-            <p:style>
-              <a:lnRef idx="2">
-                <a:schemeClr val="accent1">
-                  <a:shade val="50000"/>
-                </a:schemeClr>
-              </a:lnRef>
-              <a:fillRef idx="1">
-                <a:schemeClr val="accent1"/>
-              </a:fillRef>
-              <a:effectRef idx="0">
-                <a:schemeClr val="accent1"/>
-              </a:effectRef>
-              <a:fontRef idx="minor">
-                <a:schemeClr val="lt1"/>
-              </a:fontRef>
-            </p:style>
-            <p:txBody>
-              <a:bodyPr rtlCol="0" anchor="ctr"/>
-              <a:lstStyle/>
-              <a:p>
-                <a:pPr algn="l"/>
-                <a:endParaRPr lang="en-US" dirty="0">
-                  <a:solidFill>
-                    <a:schemeClr val="tx1"/>
-                  </a:solidFill>
-                </a:endParaRPr>
-              </a:p>
-            </p:txBody>
-          </p:sp>
-        </p:grpSp>
-        <p:grpSp>
-          <p:nvGrpSpPr>
-            <p:cNvPr id="12" name="Group 11">
+              </a:endParaRPr>
+            </a:p>
+          </p:txBody>
+        </p:sp>
+        <p:cxnSp>
+          <p:nvCxnSpPr>
+            <p:cNvPr id="20" name="Straight Connector 19">
               <a:extLst>
                 <a:ext uri="{FF2B5EF4-FFF2-40B4-BE49-F238E27FC236}">
-                  <a16:creationId xmlns:a16="http://schemas.microsoft.com/office/drawing/2014/main" id="{641AB54C-93E1-41E2-B149-5CC7683BF4D5}"/>
+                  <a16:creationId xmlns:a16="http://schemas.microsoft.com/office/drawing/2014/main" id="{D2B45636-EDEB-446E-ADFE-F2504ED661FD}"/>
                 </a:ext>
               </a:extLst>
             </p:cNvPr>
-            <p:cNvGrpSpPr/>
+            <p:cNvCxnSpPr>
+              <a:stCxn id="19" idx="4"/>
+            </p:cNvCxnSpPr>
             <p:nvPr/>
-          </p:nvGrpSpPr>
-          <p:grpSpPr>
-            <a:xfrm>
-              <a:off x="8944922" y="2816470"/>
-              <a:ext cx="492369" cy="2286000"/>
-              <a:chOff x="9425354" y="2349305"/>
-              <a:chExt cx="492369" cy="2286000"/>
+          </p:nvCxnSpPr>
+          <p:spPr>
+            <a:xfrm flipH="1">
+              <a:off x="9664505" y="2841674"/>
+              <a:ext cx="7034" cy="1793631"/>
             </a:xfrm>
-            <a:solidFill>
-              <a:srgbClr val="FF0000"/>
-            </a:solidFill>
-          </p:grpSpPr>
-          <p:sp>
-            <p:nvSpPr>
-              <p:cNvPr id="13" name="Oval 12">
-                <a:extLst>
-                  <a:ext uri="{FF2B5EF4-FFF2-40B4-BE49-F238E27FC236}">
-                    <a16:creationId xmlns:a16="http://schemas.microsoft.com/office/drawing/2014/main" id="{D6C207F3-73A5-417B-BD96-BD1017859CD3}"/>
-                  </a:ext>
-                </a:extLst>
-              </p:cNvPr>
-              <p:cNvSpPr/>
-              <p:nvPr/>
-            </p:nvSpPr>
-            <p:spPr>
-              <a:xfrm>
-                <a:off x="9425354" y="2349305"/>
-                <a:ext cx="492369" cy="492369"/>
-              </a:xfrm>
-              <a:prstGeom prst="ellipse">
-                <a:avLst/>
-              </a:prstGeom>
-              <a:grpFill/>
-              <a:ln w="44450">
-                <a:solidFill>
-                  <a:schemeClr val="tx1"/>
-                </a:solidFill>
-              </a:ln>
-            </p:spPr>
-            <p:style>
-              <a:lnRef idx="2">
-                <a:schemeClr val="accent1">
-                  <a:shade val="50000"/>
-                </a:schemeClr>
-              </a:lnRef>
-              <a:fillRef idx="1">
-                <a:schemeClr val="accent1"/>
-              </a:fillRef>
-              <a:effectRef idx="0">
-                <a:schemeClr val="accent1"/>
-              </a:effectRef>
-              <a:fontRef idx="minor">
-                <a:schemeClr val="lt1"/>
-              </a:fontRef>
-            </p:style>
-            <p:txBody>
-              <a:bodyPr rtlCol="0" anchor="ctr"/>
-              <a:lstStyle/>
-              <a:p>
-                <a:pPr algn="l"/>
-                <a:endParaRPr lang="en-US" dirty="0">
-                  <a:solidFill>
-                    <a:schemeClr val="tx1"/>
-                  </a:solidFill>
-                </a:endParaRPr>
-              </a:p>
-            </p:txBody>
-          </p:sp>
-          <p:cxnSp>
-            <p:nvCxnSpPr>
-              <p:cNvPr id="14" name="Straight Connector 13">
-                <a:extLst>
-                  <a:ext uri="{FF2B5EF4-FFF2-40B4-BE49-F238E27FC236}">
-                    <a16:creationId xmlns:a16="http://schemas.microsoft.com/office/drawing/2014/main" id="{317B3973-2B49-4F12-9426-57D2604A26E0}"/>
-                  </a:ext>
-                </a:extLst>
-              </p:cNvPr>
-              <p:cNvCxnSpPr>
-                <a:stCxn id="13" idx="4"/>
-              </p:cNvCxnSpPr>
-              <p:nvPr/>
-            </p:nvCxnSpPr>
-            <p:spPr>
-              <a:xfrm flipH="1">
-                <a:off x="9664505" y="2841674"/>
-                <a:ext cx="7034" cy="1793631"/>
-              </a:xfrm>
-              <a:prstGeom prst="line">
-                <a:avLst/>
-              </a:prstGeom>
-              <a:grpFill/>
-              <a:ln w="44450">
-                <a:solidFill>
-                  <a:schemeClr val="tx1"/>
-                </a:solidFill>
-                <a:tailEnd type="none" w="lg" len="lg"/>
-              </a:ln>
-            </p:spPr>
-            <p:style>
-              <a:lnRef idx="1">
-                <a:schemeClr val="accent1"/>
-              </a:lnRef>
-              <a:fillRef idx="0">
-                <a:schemeClr val="accent1"/>
-              </a:fillRef>
-              <a:effectRef idx="0">
-                <a:schemeClr val="accent1"/>
-              </a:effectRef>
-              <a:fontRef idx="minor">
+            <a:prstGeom prst="line">
+              <a:avLst/>
+            </a:prstGeom>
+            <a:grpFill/>
+            <a:ln w="44450">
+              <a:solidFill>
                 <a:schemeClr val="tx1"/>
-              </a:fontRef>
-            </p:style>
-          </p:cxnSp>
-        </p:grpSp>
-        <p:grpSp>
-          <p:nvGrpSpPr>
-            <p:cNvPr id="15" name="Group 14">
+              </a:solidFill>
+              <a:tailEnd type="none" w="lg" len="lg"/>
+            </a:ln>
+          </p:spPr>
+          <p:style>
+            <a:lnRef idx="1">
+              <a:schemeClr val="accent1"/>
+            </a:lnRef>
+            <a:fillRef idx="0">
+              <a:schemeClr val="accent1"/>
+            </a:fillRef>
+            <a:effectRef idx="0">
+              <a:schemeClr val="accent1"/>
+            </a:effectRef>
+            <a:fontRef idx="minor">
+              <a:schemeClr val="tx1"/>
+            </a:fontRef>
+          </p:style>
+        </p:cxnSp>
+      </p:grpSp>
+      <p:grpSp>
+        <p:nvGrpSpPr>
+          <p:cNvPr id="21" name="Group 20">
+            <a:extLst>
+              <a:ext uri="{FF2B5EF4-FFF2-40B4-BE49-F238E27FC236}">
+                <a16:creationId xmlns:a16="http://schemas.microsoft.com/office/drawing/2014/main" id="{13028469-8EEC-4220-922D-FC4B9FE7E217}"/>
+              </a:ext>
+            </a:extLst>
+          </p:cNvPr>
+          <p:cNvGrpSpPr/>
+          <p:nvPr/>
+        </p:nvGrpSpPr>
+        <p:grpSpPr>
+          <a:xfrm>
+            <a:off x="7834674" y="2816470"/>
+            <a:ext cx="492369" cy="2286000"/>
+            <a:chOff x="9425354" y="2349305"/>
+            <a:chExt cx="492369" cy="2286000"/>
+          </a:xfrm>
+          <a:solidFill>
+            <a:srgbClr val="00B050"/>
+          </a:solidFill>
+        </p:grpSpPr>
+        <p:sp>
+          <p:nvSpPr>
+            <p:cNvPr id="22" name="Oval 21">
               <a:extLst>
                 <a:ext uri="{FF2B5EF4-FFF2-40B4-BE49-F238E27FC236}">
-                  <a16:creationId xmlns:a16="http://schemas.microsoft.com/office/drawing/2014/main" id="{D3FE9661-2174-4380-AD29-91E23FEDE506}"/>
+                  <a16:creationId xmlns:a16="http://schemas.microsoft.com/office/drawing/2014/main" id="{CA3B4D4A-2EE0-4DE8-8751-3D65077D82BA}"/>
                 </a:ext>
               </a:extLst>
             </p:cNvPr>
-            <p:cNvGrpSpPr/>
+            <p:cNvSpPr/>
             <p:nvPr/>
-          </p:nvGrpSpPr>
-          <p:grpSpPr>
+          </p:nvSpPr>
+          <p:spPr>
             <a:xfrm>
-              <a:off x="10055169" y="2816470"/>
-              <a:ext cx="492369" cy="2286000"/>
-              <a:chOff x="9425354" y="2349305"/>
-              <a:chExt cx="492369" cy="2286000"/>
+              <a:off x="9425354" y="2349305"/>
+              <a:ext cx="492369" cy="492369"/>
             </a:xfrm>
-            <a:solidFill>
-              <a:srgbClr val="FF0000"/>
-            </a:solidFill>
-          </p:grpSpPr>
-          <p:sp>
-            <p:nvSpPr>
-              <p:cNvPr id="16" name="Oval 15">
-                <a:extLst>
-                  <a:ext uri="{FF2B5EF4-FFF2-40B4-BE49-F238E27FC236}">
-                    <a16:creationId xmlns:a16="http://schemas.microsoft.com/office/drawing/2014/main" id="{61C4B407-DBC9-4CD3-90C2-3B2B74152D19}"/>
-                  </a:ext>
-                </a:extLst>
-              </p:cNvPr>
-              <p:cNvSpPr/>
-              <p:nvPr/>
-            </p:nvSpPr>
-            <p:spPr>
-              <a:xfrm>
-                <a:off x="9425354" y="2349305"/>
-                <a:ext cx="492369" cy="492369"/>
-              </a:xfrm>
-              <a:prstGeom prst="ellipse">
-                <a:avLst/>
-              </a:prstGeom>
-              <a:grpFill/>
-              <a:ln w="44450">
+            <a:prstGeom prst="ellipse">
+              <a:avLst/>
+            </a:prstGeom>
+            <a:grpFill/>
+            <a:ln w="44450">
+              <a:solidFill>
+                <a:schemeClr val="tx1"/>
+              </a:solidFill>
+            </a:ln>
+          </p:spPr>
+          <p:style>
+            <a:lnRef idx="2">
+              <a:schemeClr val="accent1">
+                <a:shade val="50000"/>
+              </a:schemeClr>
+            </a:lnRef>
+            <a:fillRef idx="1">
+              <a:schemeClr val="accent1"/>
+            </a:fillRef>
+            <a:effectRef idx="0">
+              <a:schemeClr val="accent1"/>
+            </a:effectRef>
+            <a:fontRef idx="minor">
+              <a:schemeClr val="lt1"/>
+            </a:fontRef>
+          </p:style>
+          <p:txBody>
+            <a:bodyPr rtlCol="0" anchor="ctr"/>
+            <a:lstStyle/>
+            <a:p>
+              <a:pPr algn="l"/>
+              <a:endParaRPr lang="en-US" dirty="0">
                 <a:solidFill>
                   <a:schemeClr val="tx1"/>
                 </a:solidFill>
-              </a:ln>
-            </p:spPr>
-            <p:style>
-              <a:lnRef idx="2">
-                <a:schemeClr val="accent1">
-                  <a:shade val="50000"/>
-                </a:schemeClr>
-              </a:lnRef>
-              <a:fillRef idx="1">
-                <a:schemeClr val="accent1"/>
-              </a:fillRef>
-              <a:effectRef idx="0">
-                <a:schemeClr val="accent1"/>
-              </a:effectRef>
-              <a:fontRef idx="minor">
-                <a:schemeClr val="lt1"/>
-              </a:fontRef>
-            </p:style>
-            <p:txBody>
-              <a:bodyPr rtlCol="0" anchor="ctr"/>
-              <a:lstStyle/>
-              <a:p>
-                <a:pPr algn="l"/>
-                <a:endParaRPr lang="en-US" dirty="0">
-                  <a:solidFill>
-                    <a:schemeClr val="tx1"/>
-                  </a:solidFill>
-                </a:endParaRPr>
-              </a:p>
-            </p:txBody>
-          </p:sp>
-          <p:cxnSp>
-            <p:nvCxnSpPr>
-              <p:cNvPr id="17" name="Straight Connector 16">
-                <a:extLst>
-                  <a:ext uri="{FF2B5EF4-FFF2-40B4-BE49-F238E27FC236}">
-                    <a16:creationId xmlns:a16="http://schemas.microsoft.com/office/drawing/2014/main" id="{39FC7061-B0FD-4532-B944-735DB2CE9051}"/>
-                  </a:ext>
-                </a:extLst>
-              </p:cNvPr>
-              <p:cNvCxnSpPr>
-                <a:stCxn id="16" idx="4"/>
-              </p:cNvCxnSpPr>
-              <p:nvPr/>
-            </p:nvCxnSpPr>
-            <p:spPr>
-              <a:xfrm flipH="1">
-                <a:off x="9664505" y="2841674"/>
-                <a:ext cx="7034" cy="1793631"/>
-              </a:xfrm>
-              <a:prstGeom prst="line">
-                <a:avLst/>
-              </a:prstGeom>
-              <a:grpFill/>
-              <a:ln w="44450">
-                <a:solidFill>
-                  <a:schemeClr val="tx1"/>
-                </a:solidFill>
-                <a:tailEnd type="none" w="lg" len="lg"/>
-              </a:ln>
-            </p:spPr>
-            <p:style>
-              <a:lnRef idx="1">
-                <a:schemeClr val="accent1"/>
-              </a:lnRef>
-              <a:fillRef idx="0">
-                <a:schemeClr val="accent1"/>
-              </a:fillRef>
-              <a:effectRef idx="0">
-                <a:schemeClr val="accent1"/>
-              </a:effectRef>
-              <a:fontRef idx="minor">
-                <a:schemeClr val="tx1"/>
-              </a:fontRef>
-            </p:style>
-          </p:cxnSp>
-        </p:grpSp>
-        <p:grpSp>
-          <p:nvGrpSpPr>
-            <p:cNvPr id="18" name="Group 17">
+              </a:endParaRPr>
+            </a:p>
+          </p:txBody>
+        </p:sp>
+        <p:cxnSp>
+          <p:nvCxnSpPr>
+            <p:cNvPr id="23" name="Straight Connector 22">
               <a:extLst>
                 <a:ext uri="{FF2B5EF4-FFF2-40B4-BE49-F238E27FC236}">
-                  <a16:creationId xmlns:a16="http://schemas.microsoft.com/office/drawing/2014/main" id="{E1CEA52E-9B61-434A-A9E7-7E5F8FB9AE93}"/>
+                  <a16:creationId xmlns:a16="http://schemas.microsoft.com/office/drawing/2014/main" id="{6F9B27E1-DA9B-437A-82DB-92932431C11A}"/>
                 </a:ext>
               </a:extLst>
             </p:cNvPr>
-            <p:cNvGrpSpPr/>
+            <p:cNvCxnSpPr>
+              <a:stCxn id="22" idx="4"/>
+            </p:cNvCxnSpPr>
             <p:nvPr/>
-          </p:nvGrpSpPr>
-          <p:grpSpPr>
-            <a:xfrm>
-              <a:off x="5614178" y="2816470"/>
-              <a:ext cx="492369" cy="2286000"/>
-              <a:chOff x="9425354" y="2349305"/>
-              <a:chExt cx="492369" cy="2286000"/>
+          </p:nvCxnSpPr>
+          <p:spPr>
+            <a:xfrm flipH="1">
+              <a:off x="9664505" y="2841674"/>
+              <a:ext cx="7034" cy="1793631"/>
             </a:xfrm>
-            <a:solidFill>
-              <a:srgbClr val="FF0000"/>
-            </a:solidFill>
-          </p:grpSpPr>
-          <p:sp>
-            <p:nvSpPr>
-              <p:cNvPr id="19" name="Oval 18">
-                <a:extLst>
-                  <a:ext uri="{FF2B5EF4-FFF2-40B4-BE49-F238E27FC236}">
-                    <a16:creationId xmlns:a16="http://schemas.microsoft.com/office/drawing/2014/main" id="{229BBDF2-229F-477E-8347-C972FD66F67E}"/>
-                  </a:ext>
-                </a:extLst>
-              </p:cNvPr>
-              <p:cNvSpPr/>
-              <p:nvPr/>
-            </p:nvSpPr>
-            <p:spPr>
-              <a:xfrm>
-                <a:off x="9425354" y="2349305"/>
-                <a:ext cx="492369" cy="492369"/>
-              </a:xfrm>
-              <a:prstGeom prst="ellipse">
-                <a:avLst/>
-              </a:prstGeom>
-              <a:grpFill/>
-              <a:ln w="44450">
-                <a:solidFill>
-                  <a:schemeClr val="tx1"/>
-                </a:solidFill>
-              </a:ln>
-            </p:spPr>
-            <p:style>
-              <a:lnRef idx="2">
-                <a:schemeClr val="accent1">
-                  <a:shade val="50000"/>
-                </a:schemeClr>
-              </a:lnRef>
-              <a:fillRef idx="1">
-                <a:schemeClr val="accent1"/>
-              </a:fillRef>
-              <a:effectRef idx="0">
-                <a:schemeClr val="accent1"/>
-              </a:effectRef>
-              <a:fontRef idx="minor">
-                <a:schemeClr val="lt1"/>
-              </a:fontRef>
-            </p:style>
-            <p:txBody>
-              <a:bodyPr rtlCol="0" anchor="ctr"/>
-              <a:lstStyle/>
-              <a:p>
-                <a:pPr algn="l"/>
-                <a:endParaRPr lang="en-US" dirty="0">
-                  <a:solidFill>
-                    <a:schemeClr val="tx1"/>
-                  </a:solidFill>
-                </a:endParaRPr>
-              </a:p>
-            </p:txBody>
-          </p:sp>
-          <p:cxnSp>
-            <p:nvCxnSpPr>
-              <p:cNvPr id="20" name="Straight Connector 19">
-                <a:extLst>
-                  <a:ext uri="{FF2B5EF4-FFF2-40B4-BE49-F238E27FC236}">
-                    <a16:creationId xmlns:a16="http://schemas.microsoft.com/office/drawing/2014/main" id="{D2B45636-EDEB-446E-ADFE-F2504ED661FD}"/>
-                  </a:ext>
-                </a:extLst>
-              </p:cNvPr>
-              <p:cNvCxnSpPr>
-                <a:stCxn id="19" idx="4"/>
-              </p:cNvCxnSpPr>
-              <p:nvPr/>
-            </p:nvCxnSpPr>
-            <p:spPr>
-              <a:xfrm flipH="1">
-                <a:off x="9664505" y="2841674"/>
-                <a:ext cx="7034" cy="1793631"/>
-              </a:xfrm>
-              <a:prstGeom prst="line">
-                <a:avLst/>
-              </a:prstGeom>
-              <a:grpFill/>
-              <a:ln w="44450">
-                <a:solidFill>
-                  <a:schemeClr val="tx1"/>
-                </a:solidFill>
-                <a:tailEnd type="none" w="lg" len="lg"/>
-              </a:ln>
-            </p:spPr>
-            <p:style>
-              <a:lnRef idx="1">
-                <a:schemeClr val="accent1"/>
-              </a:lnRef>
-              <a:fillRef idx="0">
-                <a:schemeClr val="accent1"/>
-              </a:fillRef>
-              <a:effectRef idx="0">
-                <a:schemeClr val="accent1"/>
-              </a:effectRef>
-              <a:fontRef idx="minor">
+            <a:prstGeom prst="line">
+              <a:avLst/>
+            </a:prstGeom>
+            <a:grpFill/>
+            <a:ln w="44450">
+              <a:solidFill>
                 <a:schemeClr val="tx1"/>
-              </a:fontRef>
-            </p:style>
-          </p:cxnSp>
-        </p:grpSp>
-        <p:grpSp>
-          <p:nvGrpSpPr>
-            <p:cNvPr id="21" name="Group 20">
-              <a:extLst>
-                <a:ext uri="{FF2B5EF4-FFF2-40B4-BE49-F238E27FC236}">
-                  <a16:creationId xmlns:a16="http://schemas.microsoft.com/office/drawing/2014/main" id="{13028469-8EEC-4220-922D-FC4B9FE7E217}"/>
-                </a:ext>
-              </a:extLst>
-            </p:cNvPr>
-            <p:cNvGrpSpPr/>
-            <p:nvPr/>
-          </p:nvGrpSpPr>
-          <p:grpSpPr>
-            <a:xfrm>
-              <a:off x="7834674" y="2816470"/>
-              <a:ext cx="492369" cy="2286000"/>
-              <a:chOff x="9425354" y="2349305"/>
-              <a:chExt cx="492369" cy="2286000"/>
-            </a:xfrm>
-            <a:solidFill>
-              <a:srgbClr val="00B050"/>
-            </a:solidFill>
-          </p:grpSpPr>
-          <p:sp>
-            <p:nvSpPr>
-              <p:cNvPr id="22" name="Oval 21">
-                <a:extLst>
-                  <a:ext uri="{FF2B5EF4-FFF2-40B4-BE49-F238E27FC236}">
-                    <a16:creationId xmlns:a16="http://schemas.microsoft.com/office/drawing/2014/main" id="{CA3B4D4A-2EE0-4DE8-8751-3D65077D82BA}"/>
-                  </a:ext>
-                </a:extLst>
-              </p:cNvPr>
-              <p:cNvSpPr/>
-              <p:nvPr/>
-            </p:nvSpPr>
-            <p:spPr>
-              <a:xfrm>
-                <a:off x="9425354" y="2349305"/>
-                <a:ext cx="492369" cy="492369"/>
-              </a:xfrm>
-              <a:prstGeom prst="ellipse">
-                <a:avLst/>
-              </a:prstGeom>
-              <a:grpFill/>
-              <a:ln w="44450">
-                <a:solidFill>
-                  <a:schemeClr val="tx1"/>
-                </a:solidFill>
-              </a:ln>
-            </p:spPr>
-            <p:style>
-              <a:lnRef idx="2">
-                <a:schemeClr val="accent1">
-                  <a:shade val="50000"/>
-                </a:schemeClr>
-              </a:lnRef>
-              <a:fillRef idx="1">
-                <a:schemeClr val="accent1"/>
-              </a:fillRef>
-              <a:effectRef idx="0">
-                <a:schemeClr val="accent1"/>
-              </a:effectRef>
-              <a:fontRef idx="minor">
-                <a:schemeClr val="lt1"/>
-              </a:fontRef>
-            </p:style>
-            <p:txBody>
-              <a:bodyPr rtlCol="0" anchor="ctr"/>
-              <a:lstStyle/>
-              <a:p>
-                <a:pPr algn="l"/>
-                <a:endParaRPr lang="en-US" dirty="0">
-                  <a:solidFill>
-                    <a:schemeClr val="tx1"/>
-                  </a:solidFill>
-                </a:endParaRPr>
-              </a:p>
-            </p:txBody>
-          </p:sp>
-          <p:cxnSp>
-            <p:nvCxnSpPr>
-              <p:cNvPr id="23" name="Straight Connector 22">
-                <a:extLst>
-                  <a:ext uri="{FF2B5EF4-FFF2-40B4-BE49-F238E27FC236}">
-                    <a16:creationId xmlns:a16="http://schemas.microsoft.com/office/drawing/2014/main" id="{6F9B27E1-DA9B-437A-82DB-92932431C11A}"/>
-                  </a:ext>
-                </a:extLst>
-              </p:cNvPr>
-              <p:cNvCxnSpPr>
-                <a:stCxn id="22" idx="4"/>
-              </p:cNvCxnSpPr>
-              <p:nvPr/>
-            </p:nvCxnSpPr>
-            <p:spPr>
-              <a:xfrm flipH="1">
-                <a:off x="9664505" y="2841674"/>
-                <a:ext cx="7034" cy="1793631"/>
-              </a:xfrm>
-              <a:prstGeom prst="line">
-                <a:avLst/>
-              </a:prstGeom>
-              <a:grpFill/>
-              <a:ln w="44450">
-                <a:solidFill>
-                  <a:schemeClr val="tx1"/>
-                </a:solidFill>
-                <a:tailEnd type="none" w="lg" len="lg"/>
-              </a:ln>
-            </p:spPr>
-            <p:style>
-              <a:lnRef idx="1">
-                <a:schemeClr val="accent1"/>
-              </a:lnRef>
-              <a:fillRef idx="0">
-                <a:schemeClr val="accent1"/>
-              </a:fillRef>
-              <a:effectRef idx="0">
-                <a:schemeClr val="accent1"/>
-              </a:effectRef>
-              <a:fontRef idx="minor">
-                <a:schemeClr val="tx1"/>
-              </a:fontRef>
-            </p:style>
-          </p:cxnSp>
-        </p:grpSp>
+              </a:solidFill>
+              <a:tailEnd type="none" w="lg" len="lg"/>
+            </a:ln>
+          </p:spPr>
+          <p:style>
+            <a:lnRef idx="1">
+              <a:schemeClr val="accent1"/>
+            </a:lnRef>
+            <a:fillRef idx="0">
+              <a:schemeClr val="accent1"/>
+            </a:fillRef>
+            <a:effectRef idx="0">
+              <a:schemeClr val="accent1"/>
+            </a:effectRef>
+            <a:fontRef idx="minor">
+              <a:schemeClr val="tx1"/>
+            </a:fontRef>
+          </p:style>
+        </p:cxnSp>
       </p:grpSp>
       <p:sp>
         <p:nvSpPr>
@@ -15461,6 +16677,46 @@
                       </p:childTnLst>
                     </p:cTn>
                   </p:par>
+                  <p:par>
+                    <p:cTn id="8" fill="hold">
+                      <p:stCondLst>
+                        <p:cond delay="indefinite"/>
+                      </p:stCondLst>
+                      <p:childTnLst>
+                        <p:par>
+                          <p:cTn id="9" fill="hold">
+                            <p:stCondLst>
+                              <p:cond delay="0"/>
+                            </p:stCondLst>
+                            <p:childTnLst>
+                              <p:par>
+                                <p:cTn id="10" presetID="47" presetClass="path" presetSubtype="0" accel="50000" decel="50000" fill="hold" nodeType="clickEffect">
+                                  <p:stCondLst>
+                                    <p:cond delay="0"/>
+                                  </p:stCondLst>
+                                  <p:childTnLst>
+                                    <p:animMotion origin="layout" path="M 0.00117 -0.00138 C -0.00273 0.06436 -0.01628 0.11227 -0.02995 0.11227 C -0.04349 0.11227 -0.05508 0.06436 -0.05885 -0.00138 C -0.06458 0.06436 -0.07617 0.11227 -0.08984 0.11227 C -0.10338 0.11227 -0.11497 0.06436 -0.11875 -0.00138 C -0.12448 0.06436 -0.1362 0.11227 -0.14961 0.11227 C -0.16328 0.11227 -0.17695 0.06436 -0.1806 -0.00138 C -0.18437 0.06436 -0.19609 0.11227 -0.21159 0.11227 C -0.22318 0.11227 -0.23672 0.06436 -0.24036 -0.00138 C -0.24427 0.06436 -0.25781 0.11227 -0.27148 0.11227 C -0.28503 0.11227 -0.29661 0.06436 -0.30039 -0.00138 C -0.30612 0.06436 -0.31771 0.11227 -0.33138 0.11227 C -0.34492 0.11227 -0.35651 0.06436 -0.36224 -0.00138 C -0.36602 0.06436 -0.3776 0.11227 -0.39115 0.11227 C -0.40482 0.11227 -0.41836 0.06436 -0.42213 -0.00138 C -0.42591 0.06436 -0.4375 0.11227 -0.45299 0.11227 C -0.46667 0.11227 -0.47825 0.06436 -0.4819 -0.00138 " pathEditMode="relative" rAng="0" ptsTypes="AAAAAAAAAAAAAAAAA">
+                                      <p:cBhvr>
+                                        <p:cTn id="11" dur="2000" fill="hold"/>
+                                        <p:tgtEl>
+                                          <p:spTgt spid="21"/>
+                                        </p:tgtEl>
+                                        <p:attrNameLst>
+                                          <p:attrName>ppt_x</p:attrName>
+                                          <p:attrName>ppt_y</p:attrName>
+                                        </p:attrNameLst>
+                                      </p:cBhvr>
+                                      <p:rCtr x="-24154" y="5671"/>
+                                    </p:animMotion>
+                                  </p:childTnLst>
+                                </p:cTn>
+                              </p:par>
+                            </p:childTnLst>
+                          </p:cTn>
+                        </p:par>
+                      </p:childTnLst>
+                    </p:cTn>
+                  </p:par>
                 </p:childTnLst>
               </p:cTn>
               <p:prevCondLst>
@@ -15957,7 +17213,7 @@
                 </a:solidFill>
                 <a:latin typeface="Ink Free" panose="03080402000500000000" pitchFamily="66" charset="0"/>
               </a:rPr>
-              <a:t>) creates a new handler, which runs the callback after a delay of at least t msecs.</a:t>
+              <a:t>) creates a new handler, which runs the callback after a delay of at least t msecs.  Default value of t is 0.</a:t>
             </a:r>
           </a:p>
         </p:txBody>

</xml_diff>